<commit_message>
Added tables and graphics for "Tools and Environements" used slide.
</commit_message>
<xml_diff>
--- a/BAH CE Team Presentation Template.pptx
+++ b/BAH CE Team Presentation Template.pptx
@@ -12988,194 +12988,6 @@
       </p:sp>
       <p:sp>
         <p:nvSpPr>
-          <p:cNvPr id="150" name="Google Shape;150;p21"/>
-          <p:cNvSpPr txBox="1"/>
-          <p:nvPr/>
-        </p:nvSpPr>
-        <p:spPr>
-          <a:xfrm>
-            <a:off x="67625" y="500300"/>
-            <a:ext cx="8889300" cy="3442800"/>
-          </a:xfrm>
-          <a:prstGeom prst="rect">
-            <a:avLst/>
-          </a:prstGeom>
-          <a:noFill/>
-          <a:ln>
-            <a:noFill/>
-          </a:ln>
-        </p:spPr>
-        <p:txBody>
-          <a:bodyPr spcFirstLastPara="1" wrap="square" lIns="91425" tIns="91425" rIns="91425" bIns="91425" anchor="t" anchorCtr="0">
-            <a:noAutofit/>
-          </a:bodyPr>
-          <a:lstStyle/>
-          <a:p>
-            <a:pPr marL="457200" lvl="0" indent="-298450" algn="l" rtl="0">
-              <a:lnSpc>
-                <a:spcPct val="115000"/>
-              </a:lnSpc>
-              <a:spcBef>
-                <a:spcPts val="0"/>
-              </a:spcBef>
-              <a:spcAft>
-                <a:spcPts val="0"/>
-              </a:spcAft>
-              <a:buSzPts val="1100"/>
-              <a:buChar char="●"/>
-            </a:pPr>
-            <a:r>
-              <a:rPr lang="en" sz="1100" dirty="0"/>
-              <a:t>AWS IAM</a:t>
-            </a:r>
-          </a:p>
-          <a:p>
-            <a:pPr marL="457200" lvl="0" indent="-298450" algn="l" rtl="0">
-              <a:lnSpc>
-                <a:spcPct val="115000"/>
-              </a:lnSpc>
-              <a:spcBef>
-                <a:spcPts val="0"/>
-              </a:spcBef>
-              <a:spcAft>
-                <a:spcPts val="0"/>
-              </a:spcAft>
-              <a:buSzPts val="1100"/>
-              <a:buChar char="●"/>
-            </a:pPr>
-            <a:r>
-              <a:rPr lang="en" sz="1100" dirty="0"/>
-              <a:t>AWS S3</a:t>
-            </a:r>
-            <a:endParaRPr sz="1100" dirty="0"/>
-          </a:p>
-          <a:p>
-            <a:pPr marL="457200" lvl="0" indent="-298450" algn="l" rtl="0">
-              <a:lnSpc>
-                <a:spcPct val="115000"/>
-              </a:lnSpc>
-              <a:spcBef>
-                <a:spcPts val="0"/>
-              </a:spcBef>
-              <a:spcAft>
-                <a:spcPts val="0"/>
-              </a:spcAft>
-              <a:buSzPts val="1100"/>
-              <a:buChar char="●"/>
-            </a:pPr>
-            <a:r>
-              <a:rPr lang="en" sz="1100" dirty="0"/>
-              <a:t>AWS CodePipeline</a:t>
-            </a:r>
-            <a:endParaRPr sz="1100" dirty="0"/>
-          </a:p>
-          <a:p>
-            <a:pPr marL="457200" lvl="0" indent="-298450" algn="l" rtl="0">
-              <a:lnSpc>
-                <a:spcPct val="115000"/>
-              </a:lnSpc>
-              <a:spcBef>
-                <a:spcPts val="0"/>
-              </a:spcBef>
-              <a:spcAft>
-                <a:spcPts val="0"/>
-              </a:spcAft>
-              <a:buSzPts val="1100"/>
-              <a:buChar char="●"/>
-            </a:pPr>
-            <a:r>
-              <a:rPr lang="en" sz="1100" dirty="0"/>
-              <a:t>AWS Lambda</a:t>
-            </a:r>
-          </a:p>
-          <a:p>
-            <a:pPr marL="457200" lvl="0" indent="-298450" algn="l" rtl="0">
-              <a:lnSpc>
-                <a:spcPct val="115000"/>
-              </a:lnSpc>
-              <a:spcBef>
-                <a:spcPts val="0"/>
-              </a:spcBef>
-              <a:spcAft>
-                <a:spcPts val="0"/>
-              </a:spcAft>
-              <a:buSzPts val="1100"/>
-              <a:buChar char="●"/>
-            </a:pPr>
-            <a:r>
-              <a:rPr lang="en" sz="1100" dirty="0"/>
-              <a:t>AWS CloudWatch</a:t>
-            </a:r>
-          </a:p>
-          <a:p>
-            <a:pPr marL="457200" indent="-298450">
-              <a:lnSpc>
-                <a:spcPct val="115000"/>
-              </a:lnSpc>
-              <a:buSzPts val="1100"/>
-              <a:buFont typeface="Arial"/>
-              <a:buChar char="●"/>
-            </a:pPr>
-            <a:r>
-              <a:rPr lang="en-US" sz="1100" dirty="0"/>
-              <a:t>Git with Github.com</a:t>
-            </a:r>
-          </a:p>
-          <a:p>
-            <a:pPr marL="457200" lvl="0" indent="-298450" algn="l" rtl="0">
-              <a:lnSpc>
-                <a:spcPct val="115000"/>
-              </a:lnSpc>
-              <a:spcBef>
-                <a:spcPts val="0"/>
-              </a:spcBef>
-              <a:spcAft>
-                <a:spcPts val="0"/>
-              </a:spcAft>
-              <a:buSzPts val="1100"/>
-              <a:buChar char="●"/>
-            </a:pPr>
-            <a:endParaRPr sz="1100" dirty="0"/>
-          </a:p>
-          <a:p>
-            <a:pPr marL="457200" lvl="0" indent="-298450" algn="l" rtl="0">
-              <a:lnSpc>
-                <a:spcPct val="115000"/>
-              </a:lnSpc>
-              <a:spcBef>
-                <a:spcPts val="0"/>
-              </a:spcBef>
-              <a:spcAft>
-                <a:spcPts val="0"/>
-              </a:spcAft>
-              <a:buSzPts val="1100"/>
-              <a:buChar char="●"/>
-            </a:pPr>
-            <a:endParaRPr sz="1100" dirty="0"/>
-          </a:p>
-          <a:p>
-            <a:pPr marL="457200" marR="101600" lvl="0" indent="0" algn="l" rtl="0">
-              <a:lnSpc>
-                <a:spcPct val="115000"/>
-              </a:lnSpc>
-              <a:spcBef>
-                <a:spcPts val="3400"/>
-              </a:spcBef>
-              <a:spcAft>
-                <a:spcPts val="3400"/>
-              </a:spcAft>
-              <a:buNone/>
-            </a:pPr>
-            <a:endParaRPr sz="1050" dirty="0">
-              <a:solidFill>
-                <a:srgbClr val="333333"/>
-              </a:solidFill>
-            </a:endParaRPr>
-          </a:p>
-        </p:txBody>
-      </p:sp>
-      <p:sp>
-        <p:nvSpPr>
           <p:cNvPr id="151" name="Google Shape;151;p21"/>
           <p:cNvSpPr txBox="1"/>
           <p:nvPr/>
@@ -13294,12 +13106,522 @@
         </p:blipFill>
         <p:spPr>
           <a:xfrm>
-            <a:off x="2382250" y="605475"/>
-            <a:ext cx="5972175" cy="4109400"/>
+            <a:off x="5179220" y="520992"/>
+            <a:ext cx="3562338" cy="2451213"/>
           </a:xfrm>
           <a:prstGeom prst="rect">
             <a:avLst/>
           </a:prstGeom>
+        </p:spPr>
+      </p:pic>
+      <p:graphicFrame>
+        <p:nvGraphicFramePr>
+          <p:cNvPr id="3" name="Table 3">
+            <a:extLst>
+              <a:ext uri="{FF2B5EF4-FFF2-40B4-BE49-F238E27FC236}">
+                <a16:creationId xmlns:a16="http://schemas.microsoft.com/office/drawing/2014/main" id="{6E1AD158-2C48-BC4F-B55E-C240A5A32B07}"/>
+              </a:ext>
+            </a:extLst>
+          </p:cNvPr>
+          <p:cNvGraphicFramePr>
+            <a:graphicFrameLocks noGrp="1"/>
+          </p:cNvGraphicFramePr>
+          <p:nvPr>
+            <p:extLst>
+              <p:ext uri="{D42A27DB-BD31-4B8C-83A1-F6EECF244321}">
+                <p14:modId xmlns:p14="http://schemas.microsoft.com/office/powerpoint/2010/main" val="3385830101"/>
+              </p:ext>
+            </p:extLst>
+          </p:nvPr>
+        </p:nvGraphicFramePr>
+        <p:xfrm>
+          <a:off x="187076" y="563341"/>
+          <a:ext cx="4992144" cy="3939744"/>
+        </p:xfrm>
+        <a:graphic>
+          <a:graphicData uri="http://schemas.openxmlformats.org/drawingml/2006/table">
+            <a:tbl>
+              <a:tblPr firstRow="1" bandRow="1">
+                <a:tableStyleId>{5C22544A-7EE6-4342-B048-85BDC9FD1C3A}</a:tableStyleId>
+              </a:tblPr>
+              <a:tblGrid>
+                <a:gridCol w="1504203">
+                  <a:extLst>
+                    <a:ext uri="{9D8B030D-6E8A-4147-A177-3AD203B41FA5}">
+                      <a16:colId xmlns:a16="http://schemas.microsoft.com/office/drawing/2014/main" val="4141139090"/>
+                    </a:ext>
+                  </a:extLst>
+                </a:gridCol>
+                <a:gridCol w="3487941">
+                  <a:extLst>
+                    <a:ext uri="{9D8B030D-6E8A-4147-A177-3AD203B41FA5}">
+                      <a16:colId xmlns:a16="http://schemas.microsoft.com/office/drawing/2014/main" val="2552275362"/>
+                    </a:ext>
+                  </a:extLst>
+                </a:gridCol>
+              </a:tblGrid>
+              <a:tr h="346515">
+                <a:tc>
+                  <a:txBody>
+                    <a:bodyPr/>
+                    <a:lstStyle/>
+                    <a:p>
+                      <a:r>
+                        <a:rPr lang="en-US" sz="1400" b="1" i="0" u="none" strike="noStrike" cap="none" spc="300" dirty="0">
+                          <a:solidFill>
+                            <a:schemeClr val="lt1"/>
+                          </a:solidFill>
+                          <a:latin typeface="+mn-lt"/>
+                          <a:ea typeface="+mn-ea"/>
+                          <a:cs typeface="+mn-cs"/>
+                          <a:sym typeface="Arial"/>
+                        </a:rPr>
+                        <a:t>FEATURE</a:t>
+                      </a:r>
+                    </a:p>
+                  </a:txBody>
+                  <a:tcPr marL="131014" marR="131014" marT="65507" marB="65507"/>
+                </a:tc>
+                <a:tc>
+                  <a:txBody>
+                    <a:bodyPr/>
+                    <a:lstStyle/>
+                    <a:p>
+                      <a:r>
+                        <a:rPr lang="en-US" sz="1400" spc="300" dirty="0"/>
+                        <a:t>DESCRIPTION</a:t>
+                      </a:r>
+                    </a:p>
+                  </a:txBody>
+                  <a:tcPr marL="131014" marR="131014" marT="65507" marB="65507"/>
+                </a:tc>
+                <a:extLst>
+                  <a:ext uri="{0D108BD9-81ED-4DB2-BD59-A6C34878D82A}">
+                    <a16:rowId xmlns:a16="http://schemas.microsoft.com/office/drawing/2014/main" val="2911075909"/>
+                  </a:ext>
+                </a:extLst>
+              </a:tr>
+              <a:tr h="315846">
+                <a:tc>
+                  <a:txBody>
+                    <a:bodyPr/>
+                    <a:lstStyle/>
+                    <a:p>
+                      <a:r>
+                        <a:rPr lang="en-US" sz="1200" dirty="0">
+                          <a:solidFill>
+                            <a:srgbClr val="002060"/>
+                          </a:solidFill>
+                        </a:rPr>
+                        <a:t>AWS IAM</a:t>
+                      </a:r>
+                    </a:p>
+                  </a:txBody>
+                  <a:tcPr marL="131014" marR="131014" marT="65507" marB="65507"/>
+                </a:tc>
+                <a:tc>
+                  <a:txBody>
+                    <a:bodyPr/>
+                    <a:lstStyle/>
+                    <a:p>
+                      <a:r>
+                        <a:rPr lang="en-US" sz="1200" dirty="0">
+                          <a:solidFill>
+                            <a:srgbClr val="002060"/>
+                          </a:solidFill>
+                        </a:rPr>
+                        <a:t>AWS management tool for users, groups, roles and access</a:t>
+                      </a:r>
+                    </a:p>
+                  </a:txBody>
+                  <a:tcPr marL="131014" marR="131014" marT="65507" marB="65507"/>
+                </a:tc>
+                <a:extLst>
+                  <a:ext uri="{0D108BD9-81ED-4DB2-BD59-A6C34878D82A}">
+                    <a16:rowId xmlns:a16="http://schemas.microsoft.com/office/drawing/2014/main" val="2668638384"/>
+                  </a:ext>
+                </a:extLst>
+              </a:tr>
+              <a:tr h="499863">
+                <a:tc>
+                  <a:txBody>
+                    <a:bodyPr/>
+                    <a:lstStyle/>
+                    <a:p>
+                      <a:r>
+                        <a:rPr lang="en-US" sz="1200" dirty="0">
+                          <a:solidFill>
+                            <a:srgbClr val="002060"/>
+                          </a:solidFill>
+                        </a:rPr>
+                        <a:t>AWS S3</a:t>
+                      </a:r>
+                    </a:p>
+                  </a:txBody>
+                  <a:tcPr marL="131014" marR="131014" marT="65507" marB="65507"/>
+                </a:tc>
+                <a:tc>
+                  <a:txBody>
+                    <a:bodyPr/>
+                    <a:lstStyle/>
+                    <a:p>
+                      <a:r>
+                        <a:rPr lang="en-US" sz="1200" dirty="0">
+                          <a:solidFill>
+                            <a:srgbClr val="002060"/>
+                          </a:solidFill>
+                        </a:rPr>
+                        <a:t>Hosted storage which is serverless, highly available and not tied to a specific computer </a:t>
+                      </a:r>
+                    </a:p>
+                  </a:txBody>
+                  <a:tcPr marL="131014" marR="131014" marT="65507" marB="65507"/>
+                </a:tc>
+                <a:extLst>
+                  <a:ext uri="{0D108BD9-81ED-4DB2-BD59-A6C34878D82A}">
+                    <a16:rowId xmlns:a16="http://schemas.microsoft.com/office/drawing/2014/main" val="2936880756"/>
+                  </a:ext>
+                </a:extLst>
+              </a:tr>
+              <a:tr h="317128">
+                <a:tc>
+                  <a:txBody>
+                    <a:bodyPr/>
+                    <a:lstStyle/>
+                    <a:p>
+                      <a:r>
+                        <a:rPr lang="en-US" sz="1200" dirty="0">
+                          <a:solidFill>
+                            <a:srgbClr val="002060"/>
+                          </a:solidFill>
+                        </a:rPr>
+                        <a:t>AWS </a:t>
+                      </a:r>
+                      <a:r>
+                        <a:rPr lang="en-US" sz="1200" dirty="0" err="1">
+                          <a:solidFill>
+                            <a:srgbClr val="002060"/>
+                          </a:solidFill>
+                        </a:rPr>
+                        <a:t>CodePipeline</a:t>
+                      </a:r>
+                      <a:endParaRPr lang="en-US" sz="1200" dirty="0">
+                        <a:solidFill>
+                          <a:srgbClr val="002060"/>
+                        </a:solidFill>
+                      </a:endParaRPr>
+                    </a:p>
+                  </a:txBody>
+                  <a:tcPr marL="131014" marR="131014" marT="65507" marB="65507"/>
+                </a:tc>
+                <a:tc>
+                  <a:txBody>
+                    <a:bodyPr/>
+                    <a:lstStyle/>
+                    <a:p>
+                      <a:r>
+                        <a:rPr lang="en-US" sz="1200" dirty="0">
+                          <a:solidFill>
+                            <a:srgbClr val="002060"/>
+                          </a:solidFill>
+                        </a:rPr>
+                        <a:t>Service used to automate code deployments</a:t>
+                      </a:r>
+                    </a:p>
+                  </a:txBody>
+                  <a:tcPr marL="131014" marR="131014" marT="65507" marB="65507"/>
+                </a:tc>
+                <a:extLst>
+                  <a:ext uri="{0D108BD9-81ED-4DB2-BD59-A6C34878D82A}">
+                    <a16:rowId xmlns:a16="http://schemas.microsoft.com/office/drawing/2014/main" val="1039067205"/>
+                  </a:ext>
+                </a:extLst>
+              </a:tr>
+              <a:tr h="477154">
+                <a:tc>
+                  <a:txBody>
+                    <a:bodyPr/>
+                    <a:lstStyle/>
+                    <a:p>
+                      <a:r>
+                        <a:rPr lang="en-US" sz="1200" dirty="0">
+                          <a:solidFill>
+                            <a:srgbClr val="002060"/>
+                          </a:solidFill>
+                        </a:rPr>
+                        <a:t>AWS SNS</a:t>
+                      </a:r>
+                    </a:p>
+                  </a:txBody>
+                  <a:tcPr marL="131014" marR="131014" marT="65507" marB="65507"/>
+                </a:tc>
+                <a:tc>
+                  <a:txBody>
+                    <a:bodyPr/>
+                    <a:lstStyle/>
+                    <a:p>
+                      <a:r>
+                        <a:rPr lang="en-US" sz="1200" dirty="0">
+                          <a:solidFill>
+                            <a:srgbClr val="002060"/>
+                          </a:solidFill>
+                        </a:rPr>
+                        <a:t>Simple notification service for enabling event-driven alerts</a:t>
+                      </a:r>
+                    </a:p>
+                  </a:txBody>
+                  <a:tcPr marL="131014" marR="131014" marT="65507" marB="65507"/>
+                </a:tc>
+                <a:extLst>
+                  <a:ext uri="{0D108BD9-81ED-4DB2-BD59-A6C34878D82A}">
+                    <a16:rowId xmlns:a16="http://schemas.microsoft.com/office/drawing/2014/main" val="4030172247"/>
+                  </a:ext>
+                </a:extLst>
+              </a:tr>
+              <a:tr h="499863">
+                <a:tc>
+                  <a:txBody>
+                    <a:bodyPr/>
+                    <a:lstStyle/>
+                    <a:p>
+                      <a:r>
+                        <a:rPr lang="en-US" sz="1200" dirty="0">
+                          <a:solidFill>
+                            <a:srgbClr val="002060"/>
+                          </a:solidFill>
+                        </a:rPr>
+                        <a:t>AWS Lambda</a:t>
+                      </a:r>
+                    </a:p>
+                  </a:txBody>
+                  <a:tcPr marL="131014" marR="131014" marT="65507" marB="65507"/>
+                </a:tc>
+                <a:tc>
+                  <a:txBody>
+                    <a:bodyPr/>
+                    <a:lstStyle/>
+                    <a:p>
+                      <a:r>
+                        <a:rPr lang="en-US" sz="1200" dirty="0">
+                          <a:solidFill>
+                            <a:srgbClr val="002060"/>
+                          </a:solidFill>
+                        </a:rPr>
+                        <a:t>Serverless web service that enables execution of prebuilt or custom functions in python, </a:t>
+                      </a:r>
+                      <a:r>
+                        <a:rPr lang="en-US" sz="1200" dirty="0" err="1">
+                          <a:solidFill>
+                            <a:srgbClr val="002060"/>
+                          </a:solidFill>
+                        </a:rPr>
+                        <a:t>Javascript</a:t>
+                      </a:r>
+                      <a:r>
+                        <a:rPr lang="en-US" sz="1200" dirty="0">
+                          <a:solidFill>
+                            <a:srgbClr val="002060"/>
+                          </a:solidFill>
+                        </a:rPr>
+                        <a:t>, etc.</a:t>
+                      </a:r>
+                    </a:p>
+                  </a:txBody>
+                  <a:tcPr marL="131014" marR="131014" marT="65507" marB="65507"/>
+                </a:tc>
+                <a:extLst>
+                  <a:ext uri="{0D108BD9-81ED-4DB2-BD59-A6C34878D82A}">
+                    <a16:rowId xmlns:a16="http://schemas.microsoft.com/office/drawing/2014/main" val="327727026"/>
+                  </a:ext>
+                </a:extLst>
+              </a:tr>
+              <a:tr h="499863">
+                <a:tc>
+                  <a:txBody>
+                    <a:bodyPr/>
+                    <a:lstStyle/>
+                    <a:p>
+                      <a:r>
+                        <a:rPr lang="en-US" sz="1200" dirty="0">
+                          <a:solidFill>
+                            <a:srgbClr val="002060"/>
+                          </a:solidFill>
+                        </a:rPr>
+                        <a:t>AWS CloudWatch</a:t>
+                      </a:r>
+                    </a:p>
+                  </a:txBody>
+                  <a:tcPr marL="131014" marR="131014" marT="65507" marB="65507"/>
+                </a:tc>
+                <a:tc>
+                  <a:txBody>
+                    <a:bodyPr/>
+                    <a:lstStyle/>
+                    <a:p>
+                      <a:r>
+                        <a:rPr lang="en-US" sz="1200" dirty="0">
+                          <a:solidFill>
+                            <a:srgbClr val="002060"/>
+                          </a:solidFill>
+                        </a:rPr>
+                        <a:t>Service used to monitor events related to infrastructure and account activity</a:t>
+                      </a:r>
+                    </a:p>
+                  </a:txBody>
+                  <a:tcPr marL="131014" marR="131014" marT="65507" marB="65507"/>
+                </a:tc>
+                <a:extLst>
+                  <a:ext uri="{0D108BD9-81ED-4DB2-BD59-A6C34878D82A}">
+                    <a16:rowId xmlns:a16="http://schemas.microsoft.com/office/drawing/2014/main" val="3467678113"/>
+                  </a:ext>
+                </a:extLst>
+              </a:tr>
+              <a:tr h="423527">
+                <a:tc>
+                  <a:txBody>
+                    <a:bodyPr/>
+                    <a:lstStyle/>
+                    <a:p>
+                      <a:r>
+                        <a:rPr lang="en-US" sz="1200" dirty="0">
+                          <a:solidFill>
+                            <a:srgbClr val="002060"/>
+                          </a:solidFill>
+                        </a:rPr>
+                        <a:t>Git with </a:t>
+                      </a:r>
+                      <a:r>
+                        <a:rPr lang="en-US" sz="1200" dirty="0" err="1">
+                          <a:solidFill>
+                            <a:srgbClr val="002060"/>
+                          </a:solidFill>
+                        </a:rPr>
+                        <a:t>Github</a:t>
+                      </a:r>
+                      <a:endParaRPr lang="en-US" sz="1200" dirty="0">
+                        <a:solidFill>
+                          <a:srgbClr val="002060"/>
+                        </a:solidFill>
+                      </a:endParaRPr>
+                    </a:p>
+                  </a:txBody>
+                  <a:tcPr marL="131014" marR="131014" marT="65507" marB="65507"/>
+                </a:tc>
+                <a:tc>
+                  <a:txBody>
+                    <a:bodyPr/>
+                    <a:lstStyle/>
+                    <a:p>
+                      <a:r>
+                        <a:rPr lang="en-US" sz="1200" dirty="0">
+                          <a:solidFill>
+                            <a:srgbClr val="002060"/>
+                          </a:solidFill>
+                        </a:rPr>
+                        <a:t>Repository for website code and related files.</a:t>
+                      </a:r>
+                    </a:p>
+                  </a:txBody>
+                  <a:tcPr marL="131014" marR="131014" marT="65507" marB="65507"/>
+                </a:tc>
+                <a:extLst>
+                  <a:ext uri="{0D108BD9-81ED-4DB2-BD59-A6C34878D82A}">
+                    <a16:rowId xmlns:a16="http://schemas.microsoft.com/office/drawing/2014/main" val="2446762686"/>
+                  </a:ext>
+                </a:extLst>
+              </a:tr>
+            </a:tbl>
+          </a:graphicData>
+        </a:graphic>
+      </p:graphicFrame>
+      <p:pic>
+        <p:nvPicPr>
+          <p:cNvPr id="1026" name="Picture 2">
+            <a:extLst>
+              <a:ext uri="{FF2B5EF4-FFF2-40B4-BE49-F238E27FC236}">
+                <a16:creationId xmlns:a16="http://schemas.microsoft.com/office/drawing/2014/main" id="{0DF7E430-668B-3741-8199-B3D31BC0DA68}"/>
+              </a:ext>
+            </a:extLst>
+          </p:cNvPr>
+          <p:cNvPicPr>
+            <a:picLocks noChangeAspect="1" noChangeArrowheads="1"/>
+          </p:cNvPicPr>
+          <p:nvPr/>
+        </p:nvPicPr>
+        <p:blipFill rotWithShape="1">
+          <a:blip r:embed="rId6">
+            <a:extLst>
+              <a:ext uri="{28A0092B-C50C-407E-A947-70E740481C1C}">
+                <a14:useLocalDpi xmlns:a14="http://schemas.microsoft.com/office/drawing/2010/main" val="0"/>
+              </a:ext>
+            </a:extLst>
+          </a:blip>
+          <a:srcRect l="15716" t="14286" r="15445" b="12127"/>
+          <a:stretch/>
+        </p:blipFill>
+        <p:spPr bwMode="auto">
+          <a:xfrm>
+            <a:off x="7893844" y="3321844"/>
+            <a:ext cx="764382" cy="950119"/>
+          </a:xfrm>
+          <a:prstGeom prst="rect">
+            <a:avLst/>
+          </a:prstGeom>
+          <a:noFill/>
+          <a:extLst>
+            <a:ext uri="{909E8E84-426E-40DD-AFC4-6F175D3DCCD1}">
+              <a14:hiddenFill xmlns:a14="http://schemas.microsoft.com/office/drawing/2010/main">
+                <a:solidFill>
+                  <a:srgbClr val="FFFFFF"/>
+                </a:solidFill>
+              </a14:hiddenFill>
+            </a:ext>
+          </a:extLst>
+        </p:spPr>
+      </p:pic>
+      <p:pic>
+        <p:nvPicPr>
+          <p:cNvPr id="1030" name="Picture 6">
+            <a:extLst>
+              <a:ext uri="{FF2B5EF4-FFF2-40B4-BE49-F238E27FC236}">
+                <a16:creationId xmlns:a16="http://schemas.microsoft.com/office/drawing/2014/main" id="{7814F237-241D-5C49-BF67-4C79C9E45A27}"/>
+              </a:ext>
+            </a:extLst>
+          </p:cNvPr>
+          <p:cNvPicPr>
+            <a:picLocks noChangeAspect="1" noChangeArrowheads="1"/>
+          </p:cNvPicPr>
+          <p:nvPr/>
+        </p:nvPicPr>
+        <p:blipFill rotWithShape="1">
+          <a:blip r:embed="rId7">
+            <a:extLst>
+              <a:ext uri="{28A0092B-C50C-407E-A947-70E740481C1C}">
+                <a14:useLocalDpi xmlns:a14="http://schemas.microsoft.com/office/drawing/2010/main" val="0"/>
+              </a:ext>
+            </a:extLst>
+          </a:blip>
+          <a:srcRect l="12630" t="3952" r="9817" b="8301"/>
+          <a:stretch/>
+        </p:blipFill>
+        <p:spPr bwMode="auto">
+          <a:xfrm>
+            <a:off x="6750844" y="3214688"/>
+            <a:ext cx="964406" cy="1057275"/>
+          </a:xfrm>
+          <a:prstGeom prst="rect">
+            <a:avLst/>
+          </a:prstGeom>
+          <a:noFill/>
+          <a:extLst>
+            <a:ext uri="{909E8E84-426E-40DD-AFC4-6F175D3DCCD1}">
+              <a14:hiddenFill xmlns:a14="http://schemas.microsoft.com/office/drawing/2010/main">
+                <a:solidFill>
+                  <a:srgbClr val="FFFFFF"/>
+                </a:solidFill>
+              </a14:hiddenFill>
+            </a:ext>
+          </a:extLst>
         </p:spPr>
       </p:pic>
     </p:spTree>

</xml_diff>

<commit_message>
Changes to Slide 6 included updated diagram
</commit_message>
<xml_diff>
--- a/BAH CE Team Presentation Template.pptx
+++ b/BAH CE Team Presentation Template.pptx
@@ -12986,49 +12986,6 @@
           </a:p>
         </p:txBody>
       </p:sp>
-      <p:sp>
-        <p:nvSpPr>
-          <p:cNvPr id="151" name="Google Shape;151;p21"/>
-          <p:cNvSpPr txBox="1"/>
-          <p:nvPr/>
-        </p:nvSpPr>
-        <p:spPr>
-          <a:xfrm>
-            <a:off x="5461200" y="4955088"/>
-            <a:ext cx="3682800" cy="188400"/>
-          </a:xfrm>
-          <a:prstGeom prst="rect">
-            <a:avLst/>
-          </a:prstGeom>
-          <a:noFill/>
-          <a:ln>
-            <a:noFill/>
-          </a:ln>
-        </p:spPr>
-        <p:txBody>
-          <a:bodyPr spcFirstLastPara="1" wrap="square" lIns="91425" tIns="91425" rIns="91425" bIns="91425" anchor="ctr" anchorCtr="0">
-            <a:noAutofit/>
-          </a:bodyPr>
-          <a:lstStyle/>
-          <a:p>
-            <a:pPr marL="0" lvl="0" indent="0" algn="r" rtl="0">
-              <a:spcBef>
-                <a:spcPts val="0"/>
-              </a:spcBef>
-              <a:spcAft>
-                <a:spcPts val="0"/>
-              </a:spcAft>
-              <a:buNone/>
-            </a:pPr>
-            <a:endParaRPr sz="1000">
-              <a:latin typeface="Roboto"/>
-              <a:ea typeface="Roboto"/>
-              <a:cs typeface="Roboto"/>
-              <a:sym typeface="Roboto"/>
-            </a:endParaRPr>
-          </a:p>
-        </p:txBody>
-      </p:sp>
       <p:pic>
         <p:nvPicPr>
           <p:cNvPr id="152" name="Google Shape;152;p21"/>
@@ -13083,35 +13040,6 @@
           <a:ln>
             <a:noFill/>
           </a:ln>
-        </p:spPr>
-      </p:pic>
-      <p:pic>
-        <p:nvPicPr>
-          <p:cNvPr id="2" name="Picture 1">
-            <a:extLst>
-              <a:ext uri="{FF2B5EF4-FFF2-40B4-BE49-F238E27FC236}">
-                <a16:creationId xmlns:a16="http://schemas.microsoft.com/office/drawing/2014/main" id="{678B51DB-F813-4F06-B3A2-EA156F983F16}"/>
-              </a:ext>
-            </a:extLst>
-          </p:cNvPr>
-          <p:cNvPicPr>
-            <a:picLocks noChangeAspect="1"/>
-          </p:cNvPicPr>
-          <p:nvPr/>
-        </p:nvPicPr>
-        <p:blipFill rotWithShape="1">
-          <a:blip r:embed="rId5"/>
-          <a:srcRect l="2028" t="11771" r="8253" b="8334"/>
-          <a:stretch/>
-        </p:blipFill>
-        <p:spPr>
-          <a:xfrm>
-            <a:off x="5179220" y="520992"/>
-            <a:ext cx="3562338" cy="2451213"/>
-          </a:xfrm>
-          <a:prstGeom prst="rect">
-            <a:avLst/>
-          </a:prstGeom>
         </p:spPr>
       </p:pic>
       <p:graphicFrame>
@@ -13129,7 +13057,7 @@
           <p:nvPr>
             <p:extLst>
               <p:ext uri="{D42A27DB-BD31-4B8C-83A1-F6EECF244321}">
-                <p14:modId xmlns:p14="http://schemas.microsoft.com/office/powerpoint/2010/main" val="3385830101"/>
+                <p14:modId xmlns:p14="http://schemas.microsoft.com/office/powerpoint/2010/main" val="1133927402"/>
               </p:ext>
             </p:extLst>
           </p:nvPr>
@@ -13230,7 +13158,7 @@
                             <a:srgbClr val="002060"/>
                           </a:solidFill>
                         </a:rPr>
-                        <a:t>AWS management tool for users, groups, roles and access</a:t>
+                        <a:t>AWS identity and access management (IAM) tool for users, groups, roles and access</a:t>
                       </a:r>
                     </a:p>
                   </a:txBody>
@@ -13271,7 +13199,7 @@
                             <a:srgbClr val="002060"/>
                           </a:solidFill>
                         </a:rPr>
-                        <a:t>Hosted storage which is serverless, highly available and not tied to a specific computer </a:t>
+                        <a:t>AWS cloud storage feature, Serverless Storage Service (S3).  </a:t>
                       </a:r>
                     </a:p>
                   </a:txBody>
@@ -13366,7 +13294,7 @@
                             <a:srgbClr val="002060"/>
                           </a:solidFill>
                         </a:rPr>
-                        <a:t>Simple notification service for enabling event-driven alerts</a:t>
+                        <a:t>Simple Notification Service for enabling event-driven alerts</a:t>
                       </a:r>
                     </a:p>
                   </a:txBody>
@@ -13407,7 +13335,7 @@
                             <a:srgbClr val="002060"/>
                           </a:solidFill>
                         </a:rPr>
-                        <a:t>Serverless web service that enables execution of prebuilt or custom functions in python, </a:t>
+                        <a:t>Serverless web service that can execute  functions in python, </a:t>
                       </a:r>
                       <a:r>
                         <a:rPr lang="en-US" sz="1200" dirty="0" err="1">
@@ -13423,7 +13351,7 @@
                             <a:srgbClr val="002060"/>
                           </a:solidFill>
                         </a:rPr>
-                        <a:t>, etc.</a:t>
+                        <a:t>, etc. (prebuilt or custom)</a:t>
                       </a:r>
                     </a:p>
                   </a:txBody>
@@ -13464,7 +13392,7 @@
                             <a:srgbClr val="002060"/>
                           </a:solidFill>
                         </a:rPr>
-                        <a:t>Service used to monitor events related to infrastructure and account activity</a:t>
+                        <a:t>AWS event monitor used to view logs for infrastructure and account activity</a:t>
                       </a:r>
                     </a:p>
                   </a:txBody>
@@ -13488,21 +13416,8 @@
                             <a:srgbClr val="002060"/>
                           </a:solidFill>
                         </a:rPr>
-                        <a:t>Git with </a:t>
+                        <a:t>Git with GitHub</a:t>
                       </a:r>
-                      <a:r>
-                        <a:rPr lang="en-US" sz="1200" dirty="0" err="1">
-                          <a:solidFill>
-                            <a:srgbClr val="002060"/>
-                          </a:solidFill>
-                        </a:rPr>
-                        <a:t>Github</a:t>
-                      </a:r>
-                      <a:endParaRPr lang="en-US" sz="1200" dirty="0">
-                        <a:solidFill>
-                          <a:srgbClr val="002060"/>
-                        </a:solidFill>
-                      </a:endParaRPr>
                     </a:p>
                   </a:txBody>
                   <a:tcPr marL="131014" marR="131014" marT="65507" marB="65507"/>
@@ -13536,51 +13451,6 @@
       </p:graphicFrame>
       <p:pic>
         <p:nvPicPr>
-          <p:cNvPr id="1026" name="Picture 2">
-            <a:extLst>
-              <a:ext uri="{FF2B5EF4-FFF2-40B4-BE49-F238E27FC236}">
-                <a16:creationId xmlns:a16="http://schemas.microsoft.com/office/drawing/2014/main" id="{0DF7E430-668B-3741-8199-B3D31BC0DA68}"/>
-              </a:ext>
-            </a:extLst>
-          </p:cNvPr>
-          <p:cNvPicPr>
-            <a:picLocks noChangeAspect="1" noChangeArrowheads="1"/>
-          </p:cNvPicPr>
-          <p:nvPr/>
-        </p:nvPicPr>
-        <p:blipFill rotWithShape="1">
-          <a:blip r:embed="rId6">
-            <a:extLst>
-              <a:ext uri="{28A0092B-C50C-407E-A947-70E740481C1C}">
-                <a14:useLocalDpi xmlns:a14="http://schemas.microsoft.com/office/drawing/2010/main" val="0"/>
-              </a:ext>
-            </a:extLst>
-          </a:blip>
-          <a:srcRect l="15716" t="14286" r="15445" b="12127"/>
-          <a:stretch/>
-        </p:blipFill>
-        <p:spPr bwMode="auto">
-          <a:xfrm>
-            <a:off x="7893844" y="3321844"/>
-            <a:ext cx="764382" cy="950119"/>
-          </a:xfrm>
-          <a:prstGeom prst="rect">
-            <a:avLst/>
-          </a:prstGeom>
-          <a:noFill/>
-          <a:extLst>
-            <a:ext uri="{909E8E84-426E-40DD-AFC4-6F175D3DCCD1}">
-              <a14:hiddenFill xmlns:a14="http://schemas.microsoft.com/office/drawing/2010/main">
-                <a:solidFill>
-                  <a:srgbClr val="FFFFFF"/>
-                </a:solidFill>
-              </a14:hiddenFill>
-            </a:ext>
-          </a:extLst>
-        </p:spPr>
-      </p:pic>
-      <p:pic>
-        <p:nvPicPr>
           <p:cNvPr id="1030" name="Picture 6">
             <a:extLst>
               <a:ext uri="{FF2B5EF4-FFF2-40B4-BE49-F238E27FC236}">
@@ -13594,7 +13464,7 @@
           <p:nvPr/>
         </p:nvPicPr>
         <p:blipFill rotWithShape="1">
-          <a:blip r:embed="rId7">
+          <a:blip r:embed="rId5">
             <a:extLst>
               <a:ext uri="{28A0092B-C50C-407E-A947-70E740481C1C}">
                 <a14:useLocalDpi xmlns:a14="http://schemas.microsoft.com/office/drawing/2010/main" val="0"/>
@@ -13606,8 +13476,8 @@
         </p:blipFill>
         <p:spPr bwMode="auto">
           <a:xfrm>
-            <a:off x="6750844" y="3214688"/>
-            <a:ext cx="964406" cy="1057275"/>
+            <a:off x="6688929" y="3258855"/>
+            <a:ext cx="970922" cy="1064418"/>
           </a:xfrm>
           <a:prstGeom prst="rect">
             <a:avLst/>
@@ -13622,6 +13492,185 @@
               </a14:hiddenFill>
             </a:ext>
           </a:extLst>
+        </p:spPr>
+      </p:pic>
+      <p:pic>
+        <p:nvPicPr>
+          <p:cNvPr id="1032" name="Picture 8">
+            <a:extLst>
+              <a:ext uri="{FF2B5EF4-FFF2-40B4-BE49-F238E27FC236}">
+                <a16:creationId xmlns:a16="http://schemas.microsoft.com/office/drawing/2014/main" id="{3695E203-C7F2-624E-B22B-E25EDE4F6338}"/>
+              </a:ext>
+            </a:extLst>
+          </p:cNvPr>
+          <p:cNvPicPr>
+            <a:picLocks noChangeAspect="1" noChangeArrowheads="1"/>
+          </p:cNvPicPr>
+          <p:nvPr/>
+        </p:nvPicPr>
+        <p:blipFill>
+          <a:blip r:embed="rId6">
+            <a:extLst>
+              <a:ext uri="{28A0092B-C50C-407E-A947-70E740481C1C}">
+                <a14:useLocalDpi xmlns:a14="http://schemas.microsoft.com/office/drawing/2010/main" val="0"/>
+              </a:ext>
+            </a:extLst>
+          </a:blip>
+          <a:srcRect/>
+          <a:stretch>
+            <a:fillRect/>
+          </a:stretch>
+        </p:blipFill>
+        <p:spPr bwMode="auto">
+          <a:xfrm>
+            <a:off x="7710339" y="3193663"/>
+            <a:ext cx="1031219" cy="1195277"/>
+          </a:xfrm>
+          <a:prstGeom prst="rect">
+            <a:avLst/>
+          </a:prstGeom>
+          <a:noFill/>
+          <a:extLst>
+            <a:ext uri="{909E8E84-426E-40DD-AFC4-6F175D3DCCD1}">
+              <a14:hiddenFill xmlns:a14="http://schemas.microsoft.com/office/drawing/2010/main">
+                <a:solidFill>
+                  <a:srgbClr val="FFFFFF"/>
+                </a:solidFill>
+              </a14:hiddenFill>
+            </a:ext>
+          </a:extLst>
+        </p:spPr>
+      </p:pic>
+      <p:grpSp>
+        <p:nvGrpSpPr>
+          <p:cNvPr id="7" name="Group 6">
+            <a:extLst>
+              <a:ext uri="{FF2B5EF4-FFF2-40B4-BE49-F238E27FC236}">
+                <a16:creationId xmlns:a16="http://schemas.microsoft.com/office/drawing/2014/main" id="{BA2F2F14-557C-8E42-B2A1-741CDD0A5BEF}"/>
+              </a:ext>
+            </a:extLst>
+          </p:cNvPr>
+          <p:cNvGrpSpPr/>
+          <p:nvPr/>
+        </p:nvGrpSpPr>
+        <p:grpSpPr>
+          <a:xfrm>
+            <a:off x="5546925" y="3186520"/>
+            <a:ext cx="1091516" cy="1103010"/>
+            <a:chOff x="5546925" y="2972205"/>
+            <a:chExt cx="1091516" cy="1103010"/>
+          </a:xfrm>
+        </p:grpSpPr>
+        <p:pic>
+          <p:nvPicPr>
+            <p:cNvPr id="1034" name="Picture 10">
+              <a:extLst>
+                <a:ext uri="{FF2B5EF4-FFF2-40B4-BE49-F238E27FC236}">
+                  <a16:creationId xmlns:a16="http://schemas.microsoft.com/office/drawing/2014/main" id="{A422E78A-4B3A-174B-A47D-CC2FD209CE10}"/>
+                </a:ext>
+              </a:extLst>
+            </p:cNvPr>
+            <p:cNvPicPr>
+              <a:picLocks noChangeAspect="1" noChangeArrowheads="1"/>
+            </p:cNvPicPr>
+            <p:nvPr/>
+          </p:nvPicPr>
+          <p:blipFill>
+            <a:blip r:embed="rId7">
+              <a:extLst>
+                <a:ext uri="{28A0092B-C50C-407E-A947-70E740481C1C}">
+                  <a14:useLocalDpi xmlns:a14="http://schemas.microsoft.com/office/drawing/2010/main" val="0"/>
+                </a:ext>
+              </a:extLst>
+            </a:blip>
+            <a:srcRect/>
+            <a:stretch>
+              <a:fillRect/>
+            </a:stretch>
+          </p:blipFill>
+          <p:spPr bwMode="auto">
+            <a:xfrm>
+              <a:off x="5546925" y="2972205"/>
+              <a:ext cx="1031219" cy="1031219"/>
+            </a:xfrm>
+            <a:prstGeom prst="rect">
+              <a:avLst/>
+            </a:prstGeom>
+            <a:noFill/>
+            <a:extLst>
+              <a:ext uri="{909E8E84-426E-40DD-AFC4-6F175D3DCCD1}">
+                <a14:hiddenFill xmlns:a14="http://schemas.microsoft.com/office/drawing/2010/main">
+                  <a:solidFill>
+                    <a:srgbClr val="FFFFFF"/>
+                  </a:solidFill>
+                </a14:hiddenFill>
+              </a:ext>
+            </a:extLst>
+          </p:spPr>
+        </p:pic>
+        <p:sp>
+          <p:nvSpPr>
+            <p:cNvPr id="5" name="TextBox 4">
+              <a:extLst>
+                <a:ext uri="{FF2B5EF4-FFF2-40B4-BE49-F238E27FC236}">
+                  <a16:creationId xmlns:a16="http://schemas.microsoft.com/office/drawing/2014/main" id="{820D9399-7304-1C49-9CC0-4F925B3901F1}"/>
+                </a:ext>
+              </a:extLst>
+            </p:cNvPr>
+            <p:cNvSpPr txBox="1"/>
+            <p:nvPr/>
+          </p:nvSpPr>
+          <p:spPr>
+            <a:xfrm>
+              <a:off x="5802622" y="3852077"/>
+              <a:ext cx="835819" cy="223138"/>
+            </a:xfrm>
+            <a:prstGeom prst="rect">
+              <a:avLst/>
+            </a:prstGeom>
+            <a:noFill/>
+          </p:spPr>
+          <p:txBody>
+            <a:bodyPr wrap="square" rtlCol="0">
+              <a:spAutoFit/>
+            </a:bodyPr>
+            <a:lstStyle/>
+            <a:p>
+              <a:r>
+                <a:rPr lang="en-US" sz="850" dirty="0"/>
+                <a:t>GitHub</a:t>
+              </a:r>
+            </a:p>
+          </p:txBody>
+        </p:sp>
+      </p:grpSp>
+      <p:pic>
+        <p:nvPicPr>
+          <p:cNvPr id="10" name="Picture 9" descr="Diagram&#10;&#10;Description automatically generated">
+            <a:extLst>
+              <a:ext uri="{FF2B5EF4-FFF2-40B4-BE49-F238E27FC236}">
+                <a16:creationId xmlns:a16="http://schemas.microsoft.com/office/drawing/2014/main" id="{48EFF46F-ADF5-1645-8604-99B373B31B1E}"/>
+              </a:ext>
+            </a:extLst>
+          </p:cNvPr>
+          <p:cNvPicPr>
+            <a:picLocks noChangeAspect="1"/>
+          </p:cNvPicPr>
+          <p:nvPr/>
+        </p:nvPicPr>
+        <p:blipFill rotWithShape="1">
+          <a:blip r:embed="rId8"/>
+          <a:srcRect l="3611" t="11770" r="5353" b="5937"/>
+          <a:stretch/>
+        </p:blipFill>
+        <p:spPr>
+          <a:xfrm>
+            <a:off x="5426867" y="523607"/>
+            <a:ext cx="3495045" cy="2441314"/>
+          </a:xfrm>
+          <a:prstGeom prst="rect">
+            <a:avLst/>
+          </a:prstGeom>
         </p:spPr>
       </p:pic>
     </p:spTree>

</xml_diff>

<commit_message>
changed order of pics
</commit_message>
<xml_diff>
--- a/BAH CE Team Presentation Template.pptx
+++ b/BAH CE Team Presentation Template.pptx
@@ -8275,7 +8275,7 @@
             </a:pPr>
             <a:r>
               <a:rPr lang="en-US" dirty="0"/>
-              <a:t>S3 –Serverless storage service used to host our static webpage </a:t>
+              <a:t>S3 –Serverless storage that we used to host our static webpage based on reasons Anjelique mentioned</a:t>
             </a:r>
           </a:p>
           <a:p>
@@ -8294,7 +8294,7 @@
             </a:r>
             <a:r>
               <a:rPr lang="en-US" dirty="0"/>
-              <a:t> – Used this feature instead of Jenkins to simplify our process as it is already within AWS and we did not have a complicated build sequence.</a:t>
+              <a:t> – Used to automate code deployments and we chose to use this opposed to Jenkins, to simplify our process as it is already within AWS, and we did not have a complicated build sequence.</a:t>
             </a:r>
           </a:p>
           <a:p>
@@ -8309,7 +8309,7 @@
             </a:pPr>
             <a:r>
               <a:rPr lang="en-US" dirty="0"/>
-              <a:t>SNS – This notification is based on an S3 event and sends an email to those subscribed, to inform anytime there is an update to the bucket</a:t>
+              <a:t>SNS – Our notification is based on an S3 event and sends an email to those subscribed, to inform anytime there is an update to the bucket</a:t>
             </a:r>
           </a:p>
           <a:p>
@@ -8324,7 +8324,7 @@
             </a:pPr>
             <a:r>
               <a:rPr lang="en-US" dirty="0"/>
-              <a:t>Lambda – Included this feature for future state so that automated management of infrastructure resources can be added</a:t>
+              <a:t>Lambda – We included this feature for future state so that automated management of infrastructure resources can be added when ready</a:t>
             </a:r>
           </a:p>
           <a:p>
@@ -8339,7 +8339,7 @@
             </a:pPr>
             <a:r>
               <a:rPr lang="en-US" dirty="0"/>
-              <a:t>CloudWatch – Used to view logfiles and account activity </a:t>
+              <a:t>CloudWatch – used to view logfiles and account activity </a:t>
             </a:r>
           </a:p>
           <a:p>
@@ -8354,7 +8354,7 @@
             </a:pPr>
             <a:r>
               <a:rPr lang="en-US" dirty="0"/>
-              <a:t>GitHub – Version control tool where our project artifacts are stored</a:t>
+              <a:t>GitHub – Repository/Version control tool of choice where our project artifacts are stored</a:t>
             </a:r>
             <a:endParaRPr dirty="0"/>
           </a:p>
@@ -18822,10 +18822,10 @@
               <a:buNone/>
             </a:pPr>
             <a:r>
-              <a:rPr lang="en" sz="3600"/>
+              <a:rPr lang="en" sz="3600" dirty="0"/>
               <a:t>Thank you!!!</a:t>
             </a:r>
-            <a:endParaRPr sz="3600"/>
+            <a:endParaRPr sz="3600" dirty="0"/>
           </a:p>
         </p:txBody>
       </p:sp>
@@ -19435,750 +19435,729 @@
           </a:ln>
         </p:spPr>
       </p:pic>
-      <p:grpSp>
-        <p:nvGrpSpPr>
-          <p:cNvPr id="2" name="Group 1">
-            <a:extLst>
-              <a:ext uri="{FF2B5EF4-FFF2-40B4-BE49-F238E27FC236}">
-                <a16:creationId xmlns:a16="http://schemas.microsoft.com/office/drawing/2014/main" id="{3DE4C425-4876-495D-A028-E5EF72768C8E}"/>
-              </a:ext>
-            </a:extLst>
-          </p:cNvPr>
-          <p:cNvGrpSpPr/>
+      <p:cxnSp>
+        <p:nvCxnSpPr>
+          <p:cNvPr id="111" name="Google Shape;111;p18"/>
+          <p:cNvCxnSpPr/>
           <p:nvPr/>
-        </p:nvGrpSpPr>
-        <p:grpSpPr>
+        </p:nvCxnSpPr>
+        <p:spPr>
           <a:xfrm>
-            <a:off x="463268" y="1590864"/>
-            <a:ext cx="8436347" cy="2138633"/>
-            <a:chOff x="551757" y="1118917"/>
-            <a:chExt cx="8436347" cy="2138633"/>
+            <a:off x="3713834" y="1590864"/>
+            <a:ext cx="0" cy="2131489"/>
           </a:xfrm>
-        </p:grpSpPr>
-        <p:cxnSp>
-          <p:nvCxnSpPr>
-            <p:cNvPr id="111" name="Google Shape;111;p18"/>
-            <p:cNvCxnSpPr/>
-            <p:nvPr/>
-          </p:nvCxnSpPr>
-          <p:spPr>
-            <a:xfrm>
-              <a:off x="3802323" y="1118917"/>
-              <a:ext cx="0" cy="2131489"/>
-            </a:xfrm>
-            <a:prstGeom prst="straightConnector1">
-              <a:avLst/>
-            </a:prstGeom>
+          <a:prstGeom prst="straightConnector1">
+            <a:avLst/>
+          </a:prstGeom>
+          <a:noFill/>
+          <a:ln w="9525" cap="flat" cmpd="sng">
+            <a:solidFill>
+              <a:schemeClr val="accent2"/>
+            </a:solidFill>
+            <a:prstDash val="solid"/>
+            <a:miter lim="800000"/>
+            <a:headEnd type="none" w="sm" len="sm"/>
+            <a:tailEnd type="none" w="sm" len="sm"/>
+          </a:ln>
+        </p:spPr>
+      </p:cxnSp>
+      <p:cxnSp>
+        <p:nvCxnSpPr>
+          <p:cNvPr id="116" name="Google Shape;116;p18"/>
+          <p:cNvCxnSpPr/>
+          <p:nvPr/>
+        </p:nvCxnSpPr>
+        <p:spPr>
+          <a:xfrm>
+            <a:off x="5430167" y="1590864"/>
+            <a:ext cx="0" cy="2131489"/>
+          </a:xfrm>
+          <a:prstGeom prst="straightConnector1">
+            <a:avLst/>
+          </a:prstGeom>
+          <a:noFill/>
+          <a:ln w="9525" cap="flat" cmpd="sng">
+            <a:solidFill>
+              <a:schemeClr val="accent2"/>
+            </a:solidFill>
+            <a:prstDash val="solid"/>
+            <a:miter lim="800000"/>
+            <a:headEnd type="none" w="sm" len="sm"/>
+            <a:tailEnd type="none" w="sm" len="sm"/>
+          </a:ln>
+        </p:spPr>
+      </p:cxnSp>
+      <p:cxnSp>
+        <p:nvCxnSpPr>
+          <p:cNvPr id="119" name="Google Shape;119;p18"/>
+          <p:cNvCxnSpPr/>
+          <p:nvPr/>
+        </p:nvCxnSpPr>
+        <p:spPr>
+          <a:xfrm>
+            <a:off x="1996281" y="1590864"/>
+            <a:ext cx="0" cy="2131489"/>
+          </a:xfrm>
+          <a:prstGeom prst="straightConnector1">
+            <a:avLst/>
+          </a:prstGeom>
+          <a:noFill/>
+          <a:ln w="9525" cap="flat" cmpd="sng">
+            <a:solidFill>
+              <a:schemeClr val="accent2"/>
+            </a:solidFill>
+            <a:prstDash val="solid"/>
+            <a:miter lim="800000"/>
+            <a:headEnd type="none" w="sm" len="sm"/>
+            <a:tailEnd type="none" w="sm" len="sm"/>
+          </a:ln>
+        </p:spPr>
+      </p:cxnSp>
+      <p:sp>
+        <p:nvSpPr>
+          <p:cNvPr id="113" name="Google Shape;113;p18"/>
+          <p:cNvSpPr/>
+          <p:nvPr/>
+        </p:nvSpPr>
+        <p:spPr>
+          <a:xfrm>
+            <a:off x="5636477" y="3142577"/>
+            <a:ext cx="1256442" cy="401763"/>
+          </a:xfrm>
+          <a:prstGeom prst="rect">
+            <a:avLst/>
+          </a:prstGeom>
+          <a:noFill/>
+          <a:ln>
             <a:noFill/>
-            <a:ln w="9525" cap="flat" cmpd="sng">
-              <a:solidFill>
-                <a:schemeClr val="accent2"/>
-              </a:solidFill>
-              <a:prstDash val="solid"/>
-              <a:miter lim="800000"/>
-              <a:headEnd type="none" w="sm" len="sm"/>
-              <a:tailEnd type="none" w="sm" len="sm"/>
-            </a:ln>
-          </p:spPr>
-        </p:cxnSp>
-        <p:cxnSp>
-          <p:nvCxnSpPr>
-            <p:cNvPr id="116" name="Google Shape;116;p18"/>
-            <p:cNvCxnSpPr/>
-            <p:nvPr/>
-          </p:nvCxnSpPr>
-          <p:spPr>
-            <a:xfrm>
-              <a:off x="5609870" y="1118917"/>
-              <a:ext cx="0" cy="2131489"/>
-            </a:xfrm>
-            <a:prstGeom prst="straightConnector1">
-              <a:avLst/>
-            </a:prstGeom>
-            <a:noFill/>
-            <a:ln w="9525" cap="flat" cmpd="sng">
-              <a:solidFill>
-                <a:schemeClr val="accent2"/>
-              </a:solidFill>
-              <a:prstDash val="solid"/>
-              <a:miter lim="800000"/>
-              <a:headEnd type="none" w="sm" len="sm"/>
-              <a:tailEnd type="none" w="sm" len="sm"/>
-            </a:ln>
-          </p:spPr>
-        </p:cxnSp>
-        <p:cxnSp>
-          <p:nvCxnSpPr>
-            <p:cNvPr id="119" name="Google Shape;119;p18"/>
-            <p:cNvCxnSpPr/>
-            <p:nvPr/>
-          </p:nvCxnSpPr>
-          <p:spPr>
-            <a:xfrm>
-              <a:off x="2084770" y="1118917"/>
-              <a:ext cx="0" cy="2131489"/>
-            </a:xfrm>
-            <a:prstGeom prst="straightConnector1">
-              <a:avLst/>
-            </a:prstGeom>
-            <a:noFill/>
-            <a:ln w="9525" cap="flat" cmpd="sng">
-              <a:solidFill>
-                <a:schemeClr val="accent2"/>
-              </a:solidFill>
-              <a:prstDash val="solid"/>
-              <a:miter lim="800000"/>
-              <a:headEnd type="none" w="sm" len="sm"/>
-              <a:tailEnd type="none" w="sm" len="sm"/>
-            </a:ln>
-          </p:spPr>
-        </p:cxnSp>
-        <p:sp>
-          <p:nvSpPr>
-            <p:cNvPr id="113" name="Google Shape;113;p18"/>
-            <p:cNvSpPr/>
-            <p:nvPr/>
-          </p:nvSpPr>
-          <p:spPr>
-            <a:xfrm>
-              <a:off x="4021931" y="2682335"/>
-              <a:ext cx="1256442" cy="401763"/>
-            </a:xfrm>
-            <a:prstGeom prst="rect">
-              <a:avLst/>
-            </a:prstGeom>
-            <a:noFill/>
-            <a:ln>
-              <a:noFill/>
-            </a:ln>
-          </p:spPr>
-          <p:txBody>
-            <a:bodyPr spcFirstLastPara="1" wrap="square" lIns="68575" tIns="34275" rIns="68575" bIns="34275" anchor="t" anchorCtr="0">
-              <a:noAutofit/>
-            </a:bodyPr>
-            <a:lstStyle/>
-            <a:p>
-              <a:pPr marL="0" marR="0" lvl="0" indent="0" algn="ctr" rtl="0">
-                <a:spcBef>
-                  <a:spcPts val="0"/>
-                </a:spcBef>
-                <a:spcAft>
-                  <a:spcPts val="0"/>
-                </a:spcAft>
-                <a:buNone/>
-              </a:pPr>
-              <a:r>
-                <a:rPr lang="en" sz="1200" b="0" i="0" u="none" strike="noStrike" cap="none" dirty="0">
-                  <a:solidFill>
-                    <a:schemeClr val="accent2"/>
-                  </a:solidFill>
-                  <a:latin typeface="Oswald"/>
-                  <a:ea typeface="Oswald"/>
-                  <a:cs typeface="Oswald"/>
-                  <a:sym typeface="Oswald"/>
-                </a:rPr>
-                <a:t> HARWINDER SINGH </a:t>
-              </a:r>
-            </a:p>
-            <a:p>
-              <a:pPr marL="0" marR="0" lvl="0" indent="0" algn="ctr" rtl="0">
-                <a:spcBef>
-                  <a:spcPts val="0"/>
-                </a:spcBef>
-                <a:spcAft>
-                  <a:spcPts val="0"/>
-                </a:spcAft>
-                <a:buNone/>
-              </a:pPr>
-              <a:r>
-                <a:rPr lang="en" sz="1200" dirty="0">
-                  <a:solidFill>
-                    <a:schemeClr val="accent2"/>
-                  </a:solidFill>
-                  <a:latin typeface="Oswald"/>
-                  <a:ea typeface="Calibri"/>
-                  <a:cs typeface="Calibri"/>
-                  <a:sym typeface="Oswald"/>
-                </a:rPr>
-                <a:t>Lead Technologist</a:t>
-              </a:r>
-              <a:br>
-                <a:rPr lang="en" sz="1200" b="1" i="0" u="none" strike="noStrike" cap="none" dirty="0">
-                  <a:solidFill>
-                    <a:srgbClr val="00A6B7"/>
-                  </a:solidFill>
-                  <a:latin typeface="Calibri"/>
-                  <a:ea typeface="Calibri"/>
-                  <a:cs typeface="Calibri"/>
-                  <a:sym typeface="Calibri"/>
-                </a:rPr>
-              </a:br>
-              <a:endParaRPr sz="1200" b="0" i="0" u="none" strike="noStrike" cap="none" dirty="0">
+          </a:ln>
+        </p:spPr>
+        <p:txBody>
+          <a:bodyPr spcFirstLastPara="1" wrap="square" lIns="68575" tIns="34275" rIns="68575" bIns="34275" anchor="t" anchorCtr="0">
+            <a:noAutofit/>
+          </a:bodyPr>
+          <a:lstStyle/>
+          <a:p>
+            <a:pPr marL="0" marR="0" lvl="0" indent="0" algn="ctr" rtl="0">
+              <a:spcBef>
+                <a:spcPts val="0"/>
+              </a:spcBef>
+              <a:spcAft>
+                <a:spcPts val="0"/>
+              </a:spcAft>
+              <a:buNone/>
+            </a:pPr>
+            <a:r>
+              <a:rPr lang="en" sz="1200" b="0" i="0" u="none" strike="noStrike" cap="none" dirty="0">
                 <a:solidFill>
-                  <a:schemeClr val="dk1"/>
+                  <a:schemeClr val="accent2"/>
+                </a:solidFill>
+                <a:latin typeface="Oswald"/>
+                <a:ea typeface="Oswald"/>
+                <a:cs typeface="Oswald"/>
+                <a:sym typeface="Oswald"/>
+              </a:rPr>
+              <a:t> HARWINDER SINGH </a:t>
+            </a:r>
+          </a:p>
+          <a:p>
+            <a:pPr marL="0" marR="0" lvl="0" indent="0" algn="ctr" rtl="0">
+              <a:spcBef>
+                <a:spcPts val="0"/>
+              </a:spcBef>
+              <a:spcAft>
+                <a:spcPts val="0"/>
+              </a:spcAft>
+              <a:buNone/>
+            </a:pPr>
+            <a:r>
+              <a:rPr lang="en" sz="1200" dirty="0">
+                <a:solidFill>
+                  <a:schemeClr val="accent2"/>
+                </a:solidFill>
+                <a:latin typeface="Oswald"/>
+                <a:ea typeface="Calibri"/>
+                <a:cs typeface="Calibri"/>
+                <a:sym typeface="Oswald"/>
+              </a:rPr>
+              <a:t>Lead Technologist</a:t>
+            </a:r>
+            <a:br>
+              <a:rPr lang="en" sz="1200" b="1" i="0" u="none" strike="noStrike" cap="none" dirty="0">
+                <a:solidFill>
+                  <a:srgbClr val="00A6B7"/>
                 </a:solidFill>
                 <a:latin typeface="Calibri"/>
                 <a:ea typeface="Calibri"/>
                 <a:cs typeface="Calibri"/>
                 <a:sym typeface="Calibri"/>
-              </a:endParaRPr>
-            </a:p>
-          </p:txBody>
-        </p:sp>
-        <p:sp>
-          <p:nvSpPr>
-            <p:cNvPr id="115" name="Google Shape;115;p18"/>
-            <p:cNvSpPr/>
-            <p:nvPr/>
-          </p:nvSpPr>
-          <p:spPr>
-            <a:xfrm>
-              <a:off x="5527996" y="2682335"/>
-              <a:ext cx="1730054" cy="401763"/>
-            </a:xfrm>
-            <a:prstGeom prst="rect">
-              <a:avLst/>
-            </a:prstGeom>
+              </a:rPr>
+            </a:br>
+            <a:endParaRPr sz="1200" b="0" i="0" u="none" strike="noStrike" cap="none" dirty="0">
+              <a:solidFill>
+                <a:schemeClr val="dk1"/>
+              </a:solidFill>
+              <a:latin typeface="Calibri"/>
+              <a:ea typeface="Calibri"/>
+              <a:cs typeface="Calibri"/>
+              <a:sym typeface="Calibri"/>
+            </a:endParaRPr>
+          </a:p>
+        </p:txBody>
+      </p:sp>
+      <p:sp>
+        <p:nvSpPr>
+          <p:cNvPr id="115" name="Google Shape;115;p18"/>
+          <p:cNvSpPr/>
+          <p:nvPr/>
+        </p:nvSpPr>
+        <p:spPr>
+          <a:xfrm>
+            <a:off x="7119511" y="3154282"/>
+            <a:ext cx="1730054" cy="401763"/>
+          </a:xfrm>
+          <a:prstGeom prst="rect">
+            <a:avLst/>
+          </a:prstGeom>
+          <a:noFill/>
+          <a:ln>
             <a:noFill/>
-            <a:ln>
-              <a:noFill/>
-            </a:ln>
-          </p:spPr>
-          <p:txBody>
-            <a:bodyPr spcFirstLastPara="1" wrap="square" lIns="68575" tIns="34275" rIns="68575" bIns="34275" anchor="t" anchorCtr="0">
-              <a:noAutofit/>
-            </a:bodyPr>
-            <a:lstStyle/>
-            <a:p>
-              <a:pPr marL="0" marR="0" lvl="0" indent="0" algn="ctr" rtl="0">
-                <a:spcBef>
-                  <a:spcPts val="0"/>
-                </a:spcBef>
-                <a:spcAft>
-                  <a:spcPts val="0"/>
-                </a:spcAft>
-                <a:buNone/>
-              </a:pPr>
-              <a:r>
-                <a:rPr lang="en" sz="1200" b="0" i="0" u="none" strike="noStrike" cap="none" dirty="0">
-                  <a:solidFill>
-                    <a:schemeClr val="accent2"/>
-                  </a:solidFill>
-                  <a:latin typeface="Oswald"/>
-                  <a:ea typeface="Oswald"/>
-                  <a:cs typeface="Oswald"/>
-                  <a:sym typeface="Oswald"/>
-                </a:rPr>
-                <a:t>KATE BRIGGS</a:t>
-              </a:r>
-            </a:p>
-            <a:p>
-              <a:pPr marL="0" marR="0" lvl="0" indent="0" algn="ctr" rtl="0">
-                <a:spcBef>
-                  <a:spcPts val="0"/>
-                </a:spcBef>
-                <a:spcAft>
-                  <a:spcPts val="0"/>
-                </a:spcAft>
-                <a:buNone/>
-              </a:pPr>
-              <a:r>
-                <a:rPr lang="en" sz="1200" dirty="0">
-                  <a:solidFill>
-                    <a:schemeClr val="accent2"/>
-                  </a:solidFill>
-                  <a:latin typeface="Oswald"/>
-                  <a:ea typeface="Calibri"/>
-                  <a:cs typeface="Calibri"/>
-                  <a:sym typeface="Oswald"/>
-                </a:rPr>
-                <a:t>Technologist</a:t>
-              </a:r>
-              <a:br>
-                <a:rPr lang="en" sz="1200" b="1" i="0" u="none" strike="noStrike" cap="none" dirty="0">
-                  <a:solidFill>
-                    <a:srgbClr val="00A6B7"/>
-                  </a:solidFill>
-                  <a:latin typeface="Calibri"/>
-                  <a:ea typeface="Calibri"/>
-                  <a:cs typeface="Calibri"/>
-                  <a:sym typeface="Calibri"/>
-                </a:rPr>
-              </a:br>
-              <a:endParaRPr sz="1200" b="0" i="0" u="none" strike="noStrike" cap="none" dirty="0">
+          </a:ln>
+        </p:spPr>
+        <p:txBody>
+          <a:bodyPr spcFirstLastPara="1" wrap="square" lIns="68575" tIns="34275" rIns="68575" bIns="34275" anchor="t" anchorCtr="0">
+            <a:noAutofit/>
+          </a:bodyPr>
+          <a:lstStyle/>
+          <a:p>
+            <a:pPr marL="0" marR="0" lvl="0" indent="0" algn="ctr" rtl="0">
+              <a:spcBef>
+                <a:spcPts val="0"/>
+              </a:spcBef>
+              <a:spcAft>
+                <a:spcPts val="0"/>
+              </a:spcAft>
+              <a:buNone/>
+            </a:pPr>
+            <a:r>
+              <a:rPr lang="en" sz="1200" b="0" i="0" u="none" strike="noStrike" cap="none" dirty="0">
                 <a:solidFill>
-                  <a:schemeClr val="dk1"/>
+                  <a:schemeClr val="accent2"/>
+                </a:solidFill>
+                <a:latin typeface="Oswald"/>
+                <a:ea typeface="Oswald"/>
+                <a:cs typeface="Oswald"/>
+                <a:sym typeface="Oswald"/>
+              </a:rPr>
+              <a:t>KATE BRIGGS</a:t>
+            </a:r>
+          </a:p>
+          <a:p>
+            <a:pPr marL="0" marR="0" lvl="0" indent="0" algn="ctr" rtl="0">
+              <a:spcBef>
+                <a:spcPts val="0"/>
+              </a:spcBef>
+              <a:spcAft>
+                <a:spcPts val="0"/>
+              </a:spcAft>
+              <a:buNone/>
+            </a:pPr>
+            <a:r>
+              <a:rPr lang="en" sz="1200" dirty="0">
+                <a:solidFill>
+                  <a:schemeClr val="accent2"/>
+                </a:solidFill>
+                <a:latin typeface="Oswald"/>
+                <a:ea typeface="Calibri"/>
+                <a:cs typeface="Calibri"/>
+                <a:sym typeface="Oswald"/>
+              </a:rPr>
+              <a:t>Technologist</a:t>
+            </a:r>
+            <a:br>
+              <a:rPr lang="en" sz="1200" b="1" i="0" u="none" strike="noStrike" cap="none" dirty="0">
+                <a:solidFill>
+                  <a:srgbClr val="00A6B7"/>
                 </a:solidFill>
                 <a:latin typeface="Calibri"/>
                 <a:ea typeface="Calibri"/>
                 <a:cs typeface="Calibri"/>
                 <a:sym typeface="Calibri"/>
-              </a:endParaRPr>
-            </a:p>
-          </p:txBody>
-        </p:sp>
-        <p:sp>
-          <p:nvSpPr>
-            <p:cNvPr id="117" name="Google Shape;117;p18"/>
-            <p:cNvSpPr/>
-            <p:nvPr/>
-          </p:nvSpPr>
-          <p:spPr>
-            <a:xfrm>
-              <a:off x="2357962" y="2682335"/>
-              <a:ext cx="1171169" cy="401763"/>
-            </a:xfrm>
-            <a:prstGeom prst="rect">
-              <a:avLst/>
-            </a:prstGeom>
+              </a:rPr>
+            </a:br>
+            <a:endParaRPr sz="1200" b="0" i="0" u="none" strike="noStrike" cap="none" dirty="0">
+              <a:solidFill>
+                <a:schemeClr val="dk1"/>
+              </a:solidFill>
+              <a:latin typeface="Calibri"/>
+              <a:ea typeface="Calibri"/>
+              <a:cs typeface="Calibri"/>
+              <a:sym typeface="Calibri"/>
+            </a:endParaRPr>
+          </a:p>
+        </p:txBody>
+      </p:sp>
+      <p:sp>
+        <p:nvSpPr>
+          <p:cNvPr id="117" name="Google Shape;117;p18"/>
+          <p:cNvSpPr/>
+          <p:nvPr/>
+        </p:nvSpPr>
+        <p:spPr>
+          <a:xfrm>
+            <a:off x="598650" y="3139934"/>
+            <a:ext cx="1171169" cy="401763"/>
+          </a:xfrm>
+          <a:prstGeom prst="rect">
+            <a:avLst/>
+          </a:prstGeom>
+          <a:noFill/>
+          <a:ln>
             <a:noFill/>
-            <a:ln>
-              <a:noFill/>
-            </a:ln>
-          </p:spPr>
-          <p:txBody>
-            <a:bodyPr spcFirstLastPara="1" wrap="square" lIns="68575" tIns="34275" rIns="68575" bIns="34275" anchor="t" anchorCtr="0">
-              <a:noAutofit/>
-            </a:bodyPr>
-            <a:lstStyle/>
-            <a:p>
-              <a:pPr marL="0" marR="0" lvl="0" indent="0" algn="ctr" rtl="0">
-                <a:spcBef>
-                  <a:spcPts val="0"/>
-                </a:spcBef>
-                <a:spcAft>
-                  <a:spcPts val="0"/>
-                </a:spcAft>
-                <a:buNone/>
-              </a:pPr>
-              <a:r>
-                <a:rPr lang="en" sz="1200" b="0" i="0" u="none" strike="noStrike" cap="none" dirty="0">
-                  <a:solidFill>
-                    <a:schemeClr val="accent2"/>
-                  </a:solidFill>
-                  <a:latin typeface="Oswald"/>
-                  <a:ea typeface="Oswald"/>
-                  <a:cs typeface="Oswald"/>
-                  <a:sym typeface="Oswald"/>
-                </a:rPr>
-                <a:t>CHRIS MICKEY</a:t>
-              </a:r>
-            </a:p>
-            <a:p>
-              <a:pPr marL="0" marR="0" lvl="0" indent="0" algn="ctr" rtl="0">
-                <a:spcBef>
-                  <a:spcPts val="0"/>
-                </a:spcBef>
-                <a:spcAft>
-                  <a:spcPts val="0"/>
-                </a:spcAft>
-                <a:buNone/>
-              </a:pPr>
-              <a:r>
-                <a:rPr lang="en" sz="1200" dirty="0">
-                  <a:solidFill>
-                    <a:schemeClr val="accent2"/>
-                  </a:solidFill>
-                  <a:latin typeface="Oswald"/>
-                  <a:ea typeface="Calibri"/>
-                  <a:cs typeface="Calibri"/>
-                  <a:sym typeface="Oswald"/>
-                </a:rPr>
-                <a:t>Staff Technologist</a:t>
-              </a:r>
-              <a:br>
-                <a:rPr lang="en" sz="1200" b="1" i="0" u="none" strike="noStrike" cap="none" dirty="0">
-                  <a:solidFill>
-                    <a:srgbClr val="00A6B7"/>
-                  </a:solidFill>
-                  <a:latin typeface="Calibri"/>
-                  <a:ea typeface="Calibri"/>
-                  <a:cs typeface="Calibri"/>
-                  <a:sym typeface="Calibri"/>
-                </a:rPr>
-              </a:br>
-              <a:endParaRPr sz="1200" b="0" i="0" u="none" strike="noStrike" cap="none" dirty="0">
+          </a:ln>
+        </p:spPr>
+        <p:txBody>
+          <a:bodyPr spcFirstLastPara="1" wrap="square" lIns="68575" tIns="34275" rIns="68575" bIns="34275" anchor="t" anchorCtr="0">
+            <a:noAutofit/>
+          </a:bodyPr>
+          <a:lstStyle/>
+          <a:p>
+            <a:pPr marL="0" marR="0" lvl="0" indent="0" algn="ctr" rtl="0">
+              <a:spcBef>
+                <a:spcPts val="0"/>
+              </a:spcBef>
+              <a:spcAft>
+                <a:spcPts val="0"/>
+              </a:spcAft>
+              <a:buNone/>
+            </a:pPr>
+            <a:r>
+              <a:rPr lang="en" sz="1200" b="0" i="0" u="none" strike="noStrike" cap="none" dirty="0">
                 <a:solidFill>
-                  <a:schemeClr val="dk1"/>
+                  <a:schemeClr val="accent2"/>
+                </a:solidFill>
+                <a:latin typeface="Oswald"/>
+                <a:ea typeface="Oswald"/>
+                <a:cs typeface="Oswald"/>
+                <a:sym typeface="Oswald"/>
+              </a:rPr>
+              <a:t>CHRIS MICKEY</a:t>
+            </a:r>
+          </a:p>
+          <a:p>
+            <a:pPr marL="0" marR="0" lvl="0" indent="0" algn="ctr" rtl="0">
+              <a:spcBef>
+                <a:spcPts val="0"/>
+              </a:spcBef>
+              <a:spcAft>
+                <a:spcPts val="0"/>
+              </a:spcAft>
+              <a:buNone/>
+            </a:pPr>
+            <a:r>
+              <a:rPr lang="en" sz="1200" dirty="0">
+                <a:solidFill>
+                  <a:schemeClr val="accent2"/>
+                </a:solidFill>
+                <a:latin typeface="Oswald"/>
+                <a:ea typeface="Calibri"/>
+                <a:cs typeface="Calibri"/>
+                <a:sym typeface="Oswald"/>
+              </a:rPr>
+              <a:t>Staff Technologist</a:t>
+            </a:r>
+            <a:br>
+              <a:rPr lang="en" sz="1200" b="1" i="0" u="none" strike="noStrike" cap="none" dirty="0">
+                <a:solidFill>
+                  <a:srgbClr val="00A6B7"/>
                 </a:solidFill>
                 <a:latin typeface="Calibri"/>
                 <a:ea typeface="Calibri"/>
                 <a:cs typeface="Calibri"/>
                 <a:sym typeface="Calibri"/>
-              </a:endParaRPr>
-            </a:p>
-          </p:txBody>
-        </p:sp>
-        <p:sp>
-          <p:nvSpPr>
-            <p:cNvPr id="120" name="Google Shape;120;p18"/>
-            <p:cNvSpPr/>
-            <p:nvPr/>
-          </p:nvSpPr>
-          <p:spPr>
-            <a:xfrm>
-              <a:off x="551757" y="2682335"/>
-              <a:ext cx="1367264" cy="387415"/>
-            </a:xfrm>
-            <a:prstGeom prst="rect">
-              <a:avLst/>
-            </a:prstGeom>
+              </a:rPr>
+            </a:br>
+            <a:endParaRPr sz="1200" b="0" i="0" u="none" strike="noStrike" cap="none" dirty="0">
+              <a:solidFill>
+                <a:schemeClr val="dk1"/>
+              </a:solidFill>
+              <a:latin typeface="Calibri"/>
+              <a:ea typeface="Calibri"/>
+              <a:cs typeface="Calibri"/>
+              <a:sym typeface="Calibri"/>
+            </a:endParaRPr>
+          </a:p>
+        </p:txBody>
+      </p:sp>
+      <p:sp>
+        <p:nvSpPr>
+          <p:cNvPr id="120" name="Google Shape;120;p18"/>
+          <p:cNvSpPr/>
+          <p:nvPr/>
+        </p:nvSpPr>
+        <p:spPr>
+          <a:xfrm>
+            <a:off x="2175486" y="3154282"/>
+            <a:ext cx="1367264" cy="387415"/>
+          </a:xfrm>
+          <a:prstGeom prst="rect">
+            <a:avLst/>
+          </a:prstGeom>
+          <a:noFill/>
+          <a:ln>
             <a:noFill/>
-            <a:ln>
-              <a:noFill/>
-            </a:ln>
-          </p:spPr>
-          <p:txBody>
-            <a:bodyPr spcFirstLastPara="1" wrap="square" lIns="68575" tIns="34275" rIns="68575" bIns="34275" anchor="t" anchorCtr="0">
-              <a:noAutofit/>
-            </a:bodyPr>
-            <a:lstStyle/>
-            <a:p>
-              <a:pPr marL="0" marR="0" lvl="0" indent="0" algn="ctr" rtl="0">
-                <a:spcBef>
-                  <a:spcPts val="0"/>
-                </a:spcBef>
-                <a:spcAft>
-                  <a:spcPts val="0"/>
-                </a:spcAft>
-                <a:buNone/>
-              </a:pPr>
-              <a:r>
-                <a:rPr lang="en" sz="1200" b="0" i="0" u="none" strike="noStrike" cap="none" dirty="0">
-                  <a:solidFill>
-                    <a:schemeClr val="accent2"/>
-                  </a:solidFill>
-                  <a:latin typeface="Oswald"/>
-                  <a:ea typeface="Oswald"/>
-                  <a:cs typeface="Oswald"/>
-                  <a:sym typeface="Oswald"/>
-                </a:rPr>
-                <a:t>ANJELIQUE BUTLER</a:t>
-              </a:r>
-            </a:p>
-            <a:p>
-              <a:pPr marL="0" marR="0" lvl="0" indent="0" algn="ctr" rtl="0">
-                <a:spcBef>
-                  <a:spcPts val="0"/>
-                </a:spcBef>
-                <a:spcAft>
-                  <a:spcPts val="0"/>
-                </a:spcAft>
-                <a:buNone/>
-              </a:pPr>
-              <a:r>
-                <a:rPr lang="en" sz="1200" dirty="0">
-                  <a:solidFill>
-                    <a:schemeClr val="accent2"/>
-                  </a:solidFill>
-                  <a:latin typeface="Oswald"/>
-                  <a:ea typeface="Calibri"/>
-                  <a:cs typeface="Calibri"/>
-                  <a:sym typeface="Oswald"/>
-                </a:rPr>
-                <a:t>Staff Technologist</a:t>
-              </a:r>
-              <a:br>
-                <a:rPr lang="en" sz="1200" b="1" i="0" u="none" strike="noStrike" cap="none" dirty="0">
-                  <a:solidFill>
-                    <a:srgbClr val="00A6B7"/>
-                  </a:solidFill>
-                  <a:latin typeface="Calibri"/>
-                  <a:ea typeface="Calibri"/>
-                  <a:cs typeface="Calibri"/>
-                  <a:sym typeface="Calibri"/>
-                </a:rPr>
-              </a:br>
-              <a:endParaRPr sz="1200" b="0" i="0" u="none" strike="noStrike" cap="none" dirty="0">
+          </a:ln>
+        </p:spPr>
+        <p:txBody>
+          <a:bodyPr spcFirstLastPara="1" wrap="square" lIns="68575" tIns="34275" rIns="68575" bIns="34275" anchor="t" anchorCtr="0">
+            <a:noAutofit/>
+          </a:bodyPr>
+          <a:lstStyle/>
+          <a:p>
+            <a:pPr marL="0" marR="0" lvl="0" indent="0" algn="ctr" rtl="0">
+              <a:spcBef>
+                <a:spcPts val="0"/>
+              </a:spcBef>
+              <a:spcAft>
+                <a:spcPts val="0"/>
+              </a:spcAft>
+              <a:buNone/>
+            </a:pPr>
+            <a:r>
+              <a:rPr lang="en" sz="1200" b="0" i="0" u="none" strike="noStrike" cap="none" dirty="0">
                 <a:solidFill>
-                  <a:schemeClr val="dk1"/>
+                  <a:schemeClr val="accent2"/>
+                </a:solidFill>
+                <a:latin typeface="Oswald"/>
+                <a:ea typeface="Oswald"/>
+                <a:cs typeface="Oswald"/>
+                <a:sym typeface="Oswald"/>
+              </a:rPr>
+              <a:t>ANJELIQUE BUTLER</a:t>
+            </a:r>
+          </a:p>
+          <a:p>
+            <a:pPr marL="0" marR="0" lvl="0" indent="0" algn="ctr" rtl="0">
+              <a:spcBef>
+                <a:spcPts val="0"/>
+              </a:spcBef>
+              <a:spcAft>
+                <a:spcPts val="0"/>
+              </a:spcAft>
+              <a:buNone/>
+            </a:pPr>
+            <a:r>
+              <a:rPr lang="en" sz="1200" dirty="0">
+                <a:solidFill>
+                  <a:schemeClr val="accent2"/>
+                </a:solidFill>
+                <a:latin typeface="Oswald"/>
+                <a:ea typeface="Calibri"/>
+                <a:cs typeface="Calibri"/>
+                <a:sym typeface="Oswald"/>
+              </a:rPr>
+              <a:t>Staff Technologist</a:t>
+            </a:r>
+            <a:br>
+              <a:rPr lang="en" sz="1200" b="1" i="0" u="none" strike="noStrike" cap="none" dirty="0">
+                <a:solidFill>
+                  <a:srgbClr val="00A6B7"/>
                 </a:solidFill>
                 <a:latin typeface="Calibri"/>
                 <a:ea typeface="Calibri"/>
                 <a:cs typeface="Calibri"/>
                 <a:sym typeface="Calibri"/>
-              </a:endParaRPr>
-            </a:p>
-          </p:txBody>
-        </p:sp>
-        <p:cxnSp>
-          <p:nvCxnSpPr>
-            <p:cNvPr id="19" name="Google Shape;116;p18">
-              <a:extLst>
-                <a:ext uri="{FF2B5EF4-FFF2-40B4-BE49-F238E27FC236}">
-                  <a16:creationId xmlns:a16="http://schemas.microsoft.com/office/drawing/2014/main" id="{35FD230D-FC64-4500-BA80-673EC9347123}"/>
-                </a:ext>
-              </a:extLst>
-            </p:cNvPr>
-            <p:cNvCxnSpPr/>
-            <p:nvPr/>
-          </p:nvCxnSpPr>
-          <p:spPr>
-            <a:xfrm>
-              <a:off x="7318499" y="1126061"/>
-              <a:ext cx="0" cy="2131489"/>
-            </a:xfrm>
-            <a:prstGeom prst="straightConnector1">
-              <a:avLst/>
-            </a:prstGeom>
+              </a:rPr>
+            </a:br>
+            <a:endParaRPr sz="1200" b="0" i="0" u="none" strike="noStrike" cap="none" dirty="0">
+              <a:solidFill>
+                <a:schemeClr val="dk1"/>
+              </a:solidFill>
+              <a:latin typeface="Calibri"/>
+              <a:ea typeface="Calibri"/>
+              <a:cs typeface="Calibri"/>
+              <a:sym typeface="Calibri"/>
+            </a:endParaRPr>
+          </a:p>
+        </p:txBody>
+      </p:sp>
+      <p:cxnSp>
+        <p:nvCxnSpPr>
+          <p:cNvPr id="19" name="Google Shape;116;p18">
+            <a:extLst>
+              <a:ext uri="{FF2B5EF4-FFF2-40B4-BE49-F238E27FC236}">
+                <a16:creationId xmlns:a16="http://schemas.microsoft.com/office/drawing/2014/main" id="{35FD230D-FC64-4500-BA80-673EC9347123}"/>
+              </a:ext>
+            </a:extLst>
+          </p:cNvPr>
+          <p:cNvCxnSpPr/>
+          <p:nvPr/>
+        </p:nvCxnSpPr>
+        <p:spPr>
+          <a:xfrm>
+            <a:off x="7147719" y="1590864"/>
+            <a:ext cx="0" cy="2131489"/>
+          </a:xfrm>
+          <a:prstGeom prst="straightConnector1">
+            <a:avLst/>
+          </a:prstGeom>
+          <a:noFill/>
+          <a:ln w="9525" cap="flat" cmpd="sng">
+            <a:solidFill>
+              <a:schemeClr val="accent2"/>
+            </a:solidFill>
+            <a:prstDash val="solid"/>
+            <a:miter lim="800000"/>
+            <a:headEnd type="none" w="sm" len="sm"/>
+            <a:tailEnd type="none" w="sm" len="sm"/>
+          </a:ln>
+        </p:spPr>
+      </p:cxnSp>
+      <p:sp>
+        <p:nvSpPr>
+          <p:cNvPr id="21" name="Google Shape;115;p18">
+            <a:extLst>
+              <a:ext uri="{FF2B5EF4-FFF2-40B4-BE49-F238E27FC236}">
+                <a16:creationId xmlns:a16="http://schemas.microsoft.com/office/drawing/2014/main" id="{9AA96D84-2BD6-4B72-AAE2-7AC3F9B20C78}"/>
+              </a:ext>
+            </a:extLst>
+          </p:cNvPr>
+          <p:cNvSpPr/>
+          <p:nvPr/>
+        </p:nvSpPr>
+        <p:spPr>
+          <a:xfrm>
+            <a:off x="3700113" y="3154282"/>
+            <a:ext cx="1730054" cy="401763"/>
+          </a:xfrm>
+          <a:prstGeom prst="rect">
+            <a:avLst/>
+          </a:prstGeom>
+          <a:noFill/>
+          <a:ln>
             <a:noFill/>
-            <a:ln w="9525" cap="flat" cmpd="sng">
-              <a:solidFill>
-                <a:schemeClr val="accent2"/>
-              </a:solidFill>
-              <a:prstDash val="solid"/>
-              <a:miter lim="800000"/>
-              <a:headEnd type="none" w="sm" len="sm"/>
-              <a:tailEnd type="none" w="sm" len="sm"/>
-            </a:ln>
-          </p:spPr>
-        </p:cxnSp>
-        <p:sp>
-          <p:nvSpPr>
-            <p:cNvPr id="21" name="Google Shape;115;p18">
-              <a:extLst>
-                <a:ext uri="{FF2B5EF4-FFF2-40B4-BE49-F238E27FC236}">
-                  <a16:creationId xmlns:a16="http://schemas.microsoft.com/office/drawing/2014/main" id="{9AA96D84-2BD6-4B72-AAE2-7AC3F9B20C78}"/>
-                </a:ext>
-              </a:extLst>
-            </p:cNvPr>
-            <p:cNvSpPr/>
-            <p:nvPr/>
-          </p:nvSpPr>
-          <p:spPr>
-            <a:xfrm>
-              <a:off x="7258050" y="2672603"/>
-              <a:ext cx="1730054" cy="401763"/>
-            </a:xfrm>
-            <a:prstGeom prst="rect">
-              <a:avLst/>
-            </a:prstGeom>
-            <a:noFill/>
-            <a:ln>
-              <a:noFill/>
-            </a:ln>
-          </p:spPr>
-          <p:txBody>
-            <a:bodyPr spcFirstLastPara="1" wrap="square" lIns="68575" tIns="34275" rIns="68575" bIns="34275" anchor="t" anchorCtr="0">
-              <a:noAutofit/>
-            </a:bodyPr>
-            <a:lstStyle/>
-            <a:p>
-              <a:pPr marL="0" marR="0" lvl="0" indent="0" algn="ctr" rtl="0">
-                <a:spcBef>
-                  <a:spcPts val="0"/>
-                </a:spcBef>
-                <a:spcAft>
-                  <a:spcPts val="0"/>
-                </a:spcAft>
-                <a:buNone/>
-              </a:pPr>
-              <a:r>
-                <a:rPr lang="en" sz="1200" b="0" i="0" u="none" strike="noStrike" cap="none" dirty="0">
-                  <a:solidFill>
-                    <a:schemeClr val="accent2"/>
-                  </a:solidFill>
-                  <a:latin typeface="Oswald"/>
-                  <a:ea typeface="Oswald"/>
-                  <a:cs typeface="Oswald"/>
-                  <a:sym typeface="Oswald"/>
-                </a:rPr>
-                <a:t>SARAH GRIMM</a:t>
-              </a:r>
-            </a:p>
-            <a:p>
-              <a:pPr marL="0" marR="0" lvl="0" indent="0" algn="ctr" rtl="0">
-                <a:spcBef>
-                  <a:spcPts val="0"/>
-                </a:spcBef>
-                <a:spcAft>
-                  <a:spcPts val="0"/>
-                </a:spcAft>
-                <a:buNone/>
-              </a:pPr>
-              <a:r>
-                <a:rPr lang="en" sz="1200" dirty="0">
-                  <a:solidFill>
-                    <a:schemeClr val="accent2"/>
-                  </a:solidFill>
-                  <a:latin typeface="Oswald"/>
-                  <a:ea typeface="Calibri"/>
-                  <a:cs typeface="Calibri"/>
-                  <a:sym typeface="Oswald"/>
-                </a:rPr>
-                <a:t>Technologist</a:t>
-              </a:r>
-              <a:br>
-                <a:rPr lang="en" sz="1200" b="1" i="0" u="none" strike="noStrike" cap="none" dirty="0">
-                  <a:solidFill>
-                    <a:srgbClr val="00A6B7"/>
-                  </a:solidFill>
-                  <a:latin typeface="Calibri"/>
-                  <a:ea typeface="Calibri"/>
-                  <a:cs typeface="Calibri"/>
-                  <a:sym typeface="Calibri"/>
-                </a:rPr>
-              </a:br>
-              <a:endParaRPr sz="1200" b="0" i="0" u="none" strike="noStrike" cap="none" dirty="0">
+          </a:ln>
+        </p:spPr>
+        <p:txBody>
+          <a:bodyPr spcFirstLastPara="1" wrap="square" lIns="68575" tIns="34275" rIns="68575" bIns="34275" anchor="t" anchorCtr="0">
+            <a:noAutofit/>
+          </a:bodyPr>
+          <a:lstStyle/>
+          <a:p>
+            <a:pPr marL="0" marR="0" lvl="0" indent="0" algn="ctr" rtl="0">
+              <a:spcBef>
+                <a:spcPts val="0"/>
+              </a:spcBef>
+              <a:spcAft>
+                <a:spcPts val="0"/>
+              </a:spcAft>
+              <a:buNone/>
+            </a:pPr>
+            <a:r>
+              <a:rPr lang="en" sz="1200" b="0" i="0" u="none" strike="noStrike" cap="none" dirty="0">
                 <a:solidFill>
-                  <a:schemeClr val="dk1"/>
+                  <a:schemeClr val="accent2"/>
+                </a:solidFill>
+                <a:latin typeface="Oswald"/>
+                <a:ea typeface="Oswald"/>
+                <a:cs typeface="Oswald"/>
+                <a:sym typeface="Oswald"/>
+              </a:rPr>
+              <a:t>SARAH GRIMM</a:t>
+            </a:r>
+          </a:p>
+          <a:p>
+            <a:pPr marL="0" marR="0" lvl="0" indent="0" algn="ctr" rtl="0">
+              <a:spcBef>
+                <a:spcPts val="0"/>
+              </a:spcBef>
+              <a:spcAft>
+                <a:spcPts val="0"/>
+              </a:spcAft>
+              <a:buNone/>
+            </a:pPr>
+            <a:r>
+              <a:rPr lang="en" sz="1200" dirty="0">
+                <a:solidFill>
+                  <a:schemeClr val="accent2"/>
+                </a:solidFill>
+                <a:latin typeface="Oswald"/>
+                <a:ea typeface="Calibri"/>
+                <a:cs typeface="Calibri"/>
+                <a:sym typeface="Oswald"/>
+              </a:rPr>
+              <a:t>Technologist</a:t>
+            </a:r>
+            <a:br>
+              <a:rPr lang="en" sz="1200" b="1" i="0" u="none" strike="noStrike" cap="none" dirty="0">
+                <a:solidFill>
+                  <a:srgbClr val="00A6B7"/>
                 </a:solidFill>
                 <a:latin typeface="Calibri"/>
                 <a:ea typeface="Calibri"/>
                 <a:cs typeface="Calibri"/>
                 <a:sym typeface="Calibri"/>
-              </a:endParaRPr>
-            </a:p>
-          </p:txBody>
-        </p:sp>
-        <p:pic>
-          <p:nvPicPr>
-            <p:cNvPr id="5" name="Picture 4" descr="A person with a mustache&#10;&#10;Description automatically generated with medium confidence">
-              <a:extLst>
-                <a:ext uri="{FF2B5EF4-FFF2-40B4-BE49-F238E27FC236}">
-                  <a16:creationId xmlns:a16="http://schemas.microsoft.com/office/drawing/2014/main" id="{580B79AC-F4E8-493C-8A61-D6E2F42414F8}"/>
-                </a:ext>
-              </a:extLst>
-            </p:cNvPr>
-            <p:cNvPicPr>
-              <a:picLocks noChangeAspect="1"/>
-            </p:cNvPicPr>
-            <p:nvPr/>
-          </p:nvPicPr>
-          <p:blipFill rotWithShape="1">
-            <a:blip r:embed="rId5"/>
-            <a:srcRect t="15562"/>
-            <a:stretch/>
-          </p:blipFill>
-          <p:spPr>
-            <a:xfrm>
-              <a:off x="2492126" y="1314449"/>
-              <a:ext cx="868704" cy="1113781"/>
-            </a:xfrm>
-            <a:prstGeom prst="rect">
-              <a:avLst/>
-            </a:prstGeom>
-          </p:spPr>
-        </p:pic>
-        <p:pic>
-          <p:nvPicPr>
-            <p:cNvPr id="6" name="Picture 5">
-              <a:extLst>
-                <a:ext uri="{FF2B5EF4-FFF2-40B4-BE49-F238E27FC236}">
-                  <a16:creationId xmlns:a16="http://schemas.microsoft.com/office/drawing/2014/main" id="{D583EF4E-314E-487F-BA9E-97A29043D389}"/>
-                </a:ext>
-              </a:extLst>
-            </p:cNvPr>
-            <p:cNvPicPr>
-              <a:picLocks noChangeAspect="1"/>
-            </p:cNvPicPr>
-            <p:nvPr/>
-          </p:nvPicPr>
-          <p:blipFill rotWithShape="1">
-            <a:blip r:embed="rId6"/>
-            <a:srcRect l="18237" r="19318"/>
-            <a:stretch/>
-          </p:blipFill>
-          <p:spPr>
-            <a:xfrm>
-              <a:off x="6010321" y="1307197"/>
-              <a:ext cx="868704" cy="1114215"/>
-            </a:xfrm>
-            <a:prstGeom prst="rect">
-              <a:avLst/>
-            </a:prstGeom>
-          </p:spPr>
-        </p:pic>
-        <p:pic>
-          <p:nvPicPr>
-            <p:cNvPr id="10" name="Picture 9" descr="A person smiling for the camera&#10;&#10;Description automatically generated with low confidence">
-              <a:extLst>
-                <a:ext uri="{FF2B5EF4-FFF2-40B4-BE49-F238E27FC236}">
-                  <a16:creationId xmlns:a16="http://schemas.microsoft.com/office/drawing/2014/main" id="{87C3A243-15E7-4658-9278-A33296FBCF7F}"/>
-                </a:ext>
-              </a:extLst>
-            </p:cNvPr>
-            <p:cNvPicPr>
-              <a:picLocks noChangeAspect="1"/>
-            </p:cNvPicPr>
-            <p:nvPr/>
-          </p:nvPicPr>
-          <p:blipFill rotWithShape="1">
-            <a:blip r:embed="rId7"/>
-            <a:srcRect t="14524"/>
-            <a:stretch/>
-          </p:blipFill>
-          <p:spPr>
-            <a:xfrm>
-              <a:off x="7691543" y="1314449"/>
-              <a:ext cx="863067" cy="1114215"/>
-            </a:xfrm>
-            <a:prstGeom prst="rect">
-              <a:avLst/>
-            </a:prstGeom>
-          </p:spPr>
-        </p:pic>
-        <p:pic>
-          <p:nvPicPr>
-            <p:cNvPr id="11" name="Picture 10">
-              <a:extLst>
-                <a:ext uri="{FF2B5EF4-FFF2-40B4-BE49-F238E27FC236}">
-                  <a16:creationId xmlns:a16="http://schemas.microsoft.com/office/drawing/2014/main" id="{B8CE24F4-E9C3-448A-BF8E-57722F05B2C0}"/>
-                </a:ext>
-              </a:extLst>
-            </p:cNvPr>
-            <p:cNvPicPr>
-              <a:picLocks noChangeAspect="1"/>
-            </p:cNvPicPr>
-            <p:nvPr/>
-          </p:nvPicPr>
-          <p:blipFill rotWithShape="1">
-            <a:blip r:embed="rId8"/>
-            <a:srcRect l="9877" t="12507" r="33655" b="36806"/>
-            <a:stretch/>
-          </p:blipFill>
-          <p:spPr>
-            <a:xfrm>
-              <a:off x="785793" y="1300379"/>
-              <a:ext cx="899191" cy="1121033"/>
-            </a:xfrm>
-            <a:prstGeom prst="rect">
-              <a:avLst/>
-            </a:prstGeom>
-            <a:effectLst/>
-          </p:spPr>
-        </p:pic>
-        <p:pic>
-          <p:nvPicPr>
-            <p:cNvPr id="12" name="Picture 11">
-              <a:extLst>
-                <a:ext uri="{FF2B5EF4-FFF2-40B4-BE49-F238E27FC236}">
-                  <a16:creationId xmlns:a16="http://schemas.microsoft.com/office/drawing/2014/main" id="{736259F3-E430-4D07-A258-9575CB9B9241}"/>
-                </a:ext>
-              </a:extLst>
-            </p:cNvPr>
-            <p:cNvPicPr>
-              <a:picLocks noChangeAspect="1"/>
-            </p:cNvPicPr>
-            <p:nvPr/>
-          </p:nvPicPr>
-          <p:blipFill>
-            <a:blip r:embed="rId9"/>
-            <a:stretch>
-              <a:fillRect/>
-            </a:stretch>
-          </p:blipFill>
-          <p:spPr>
-            <a:xfrm>
-              <a:off x="4240056" y="1299029"/>
-              <a:ext cx="880237" cy="1124857"/>
-            </a:xfrm>
-            <a:prstGeom prst="rect">
-              <a:avLst/>
-            </a:prstGeom>
-          </p:spPr>
-        </p:pic>
-      </p:grpSp>
+              </a:rPr>
+            </a:br>
+            <a:endParaRPr sz="1200" b="0" i="0" u="none" strike="noStrike" cap="none" dirty="0">
+              <a:solidFill>
+                <a:schemeClr val="dk1"/>
+              </a:solidFill>
+              <a:latin typeface="Calibri"/>
+              <a:ea typeface="Calibri"/>
+              <a:cs typeface="Calibri"/>
+              <a:sym typeface="Calibri"/>
+            </a:endParaRPr>
+          </a:p>
+        </p:txBody>
+      </p:sp>
+      <p:pic>
+        <p:nvPicPr>
+          <p:cNvPr id="5" name="Picture 4" descr="A person with a mustache&#10;&#10;Description automatically generated with medium confidence">
+            <a:extLst>
+              <a:ext uri="{FF2B5EF4-FFF2-40B4-BE49-F238E27FC236}">
+                <a16:creationId xmlns:a16="http://schemas.microsoft.com/office/drawing/2014/main" id="{580B79AC-F4E8-493C-8A61-D6E2F42414F8}"/>
+              </a:ext>
+            </a:extLst>
+          </p:cNvPr>
+          <p:cNvPicPr>
+            <a:picLocks noChangeAspect="1"/>
+          </p:cNvPicPr>
+          <p:nvPr/>
+        </p:nvPicPr>
+        <p:blipFill rotWithShape="1">
+          <a:blip r:embed="rId5"/>
+          <a:srcRect t="15562"/>
+          <a:stretch/>
+        </p:blipFill>
+        <p:spPr>
+          <a:xfrm>
+            <a:off x="749883" y="1770976"/>
+            <a:ext cx="868704" cy="1113781"/>
+          </a:xfrm>
+          <a:prstGeom prst="rect">
+            <a:avLst/>
+          </a:prstGeom>
+        </p:spPr>
+      </p:pic>
+      <p:pic>
+        <p:nvPicPr>
+          <p:cNvPr id="6" name="Picture 5">
+            <a:extLst>
+              <a:ext uri="{FF2B5EF4-FFF2-40B4-BE49-F238E27FC236}">
+                <a16:creationId xmlns:a16="http://schemas.microsoft.com/office/drawing/2014/main" id="{D583EF4E-314E-487F-BA9E-97A29043D389}"/>
+              </a:ext>
+            </a:extLst>
+          </p:cNvPr>
+          <p:cNvPicPr>
+            <a:picLocks noChangeAspect="1"/>
+          </p:cNvPicPr>
+          <p:nvPr/>
+        </p:nvPicPr>
+        <p:blipFill rotWithShape="1">
+          <a:blip r:embed="rId6"/>
+          <a:srcRect l="18237" r="19318"/>
+          <a:stretch/>
+        </p:blipFill>
+        <p:spPr>
+          <a:xfrm>
+            <a:off x="7550186" y="1770542"/>
+            <a:ext cx="868704" cy="1114215"/>
+          </a:xfrm>
+          <a:prstGeom prst="rect">
+            <a:avLst/>
+          </a:prstGeom>
+        </p:spPr>
+      </p:pic>
+      <p:pic>
+        <p:nvPicPr>
+          <p:cNvPr id="10" name="Picture 9" descr="A person smiling for the camera&#10;&#10;Description automatically generated with low confidence">
+            <a:extLst>
+              <a:ext uri="{FF2B5EF4-FFF2-40B4-BE49-F238E27FC236}">
+                <a16:creationId xmlns:a16="http://schemas.microsoft.com/office/drawing/2014/main" id="{87C3A243-15E7-4658-9278-A33296FBCF7F}"/>
+              </a:ext>
+            </a:extLst>
+          </p:cNvPr>
+          <p:cNvPicPr>
+            <a:picLocks noChangeAspect="1"/>
+          </p:cNvPicPr>
+          <p:nvPr/>
+        </p:nvPicPr>
+        <p:blipFill rotWithShape="1">
+          <a:blip r:embed="rId7"/>
+          <a:srcRect t="14524"/>
+          <a:stretch/>
+        </p:blipFill>
+        <p:spPr>
+          <a:xfrm>
+            <a:off x="4150518" y="1770542"/>
+            <a:ext cx="863067" cy="1114215"/>
+          </a:xfrm>
+          <a:prstGeom prst="rect">
+            <a:avLst/>
+          </a:prstGeom>
+        </p:spPr>
+      </p:pic>
+      <p:pic>
+        <p:nvPicPr>
+          <p:cNvPr id="11" name="Picture 10">
+            <a:extLst>
+              <a:ext uri="{FF2B5EF4-FFF2-40B4-BE49-F238E27FC236}">
+                <a16:creationId xmlns:a16="http://schemas.microsoft.com/office/drawing/2014/main" id="{B8CE24F4-E9C3-448A-BF8E-57722F05B2C0}"/>
+              </a:ext>
+            </a:extLst>
+          </p:cNvPr>
+          <p:cNvPicPr>
+            <a:picLocks noChangeAspect="1"/>
+          </p:cNvPicPr>
+          <p:nvPr/>
+        </p:nvPicPr>
+        <p:blipFill rotWithShape="1">
+          <a:blip r:embed="rId8"/>
+          <a:srcRect l="9877" t="12507" r="33655" b="36806"/>
+          <a:stretch/>
+        </p:blipFill>
+        <p:spPr>
+          <a:xfrm>
+            <a:off x="2398062" y="1763724"/>
+            <a:ext cx="899191" cy="1121033"/>
+          </a:xfrm>
+          <a:prstGeom prst="rect">
+            <a:avLst/>
+          </a:prstGeom>
+          <a:effectLst/>
+        </p:spPr>
+      </p:pic>
+      <p:pic>
+        <p:nvPicPr>
+          <p:cNvPr id="12" name="Picture 11">
+            <a:extLst>
+              <a:ext uri="{FF2B5EF4-FFF2-40B4-BE49-F238E27FC236}">
+                <a16:creationId xmlns:a16="http://schemas.microsoft.com/office/drawing/2014/main" id="{736259F3-E430-4D07-A258-9575CB9B9241}"/>
+              </a:ext>
+            </a:extLst>
+          </p:cNvPr>
+          <p:cNvPicPr>
+            <a:picLocks noChangeAspect="1"/>
+          </p:cNvPicPr>
+          <p:nvPr/>
+        </p:nvPicPr>
+        <p:blipFill>
+          <a:blip r:embed="rId9"/>
+          <a:stretch>
+            <a:fillRect/>
+          </a:stretch>
+        </p:blipFill>
+        <p:spPr>
+          <a:xfrm>
+            <a:off x="5832634" y="1759900"/>
+            <a:ext cx="880237" cy="1124857"/>
+          </a:xfrm>
+          <a:prstGeom prst="rect">
+            <a:avLst/>
+          </a:prstGeom>
+        </p:spPr>
+      </p:pic>
     </p:spTree>
   </p:cSld>
   <p:clrMapOvr>

</xml_diff>